<commit_message>
Added Information to functions lection
</commit_message>
<xml_diff>
--- a/04.functions.pptx
+++ b/04.functions.pptx
@@ -17,13 +17,15 @@
     <p:sldId id="260" r:id="rId11"/>
     <p:sldId id="261" r:id="rId12"/>
     <p:sldId id="262" r:id="rId13"/>
-    <p:sldId id="263" r:id="rId14"/>
-    <p:sldId id="264" r:id="rId15"/>
-    <p:sldId id="268" r:id="rId16"/>
-    <p:sldId id="271" r:id="rId17"/>
-    <p:sldId id="272" r:id="rId18"/>
-    <p:sldId id="273" r:id="rId19"/>
-    <p:sldId id="274" r:id="rId20"/>
+    <p:sldId id="275" r:id="rId14"/>
+    <p:sldId id="276" r:id="rId15"/>
+    <p:sldId id="263" r:id="rId16"/>
+    <p:sldId id="264" r:id="rId17"/>
+    <p:sldId id="268" r:id="rId18"/>
+    <p:sldId id="271" r:id="rId19"/>
+    <p:sldId id="272" r:id="rId20"/>
+    <p:sldId id="273" r:id="rId21"/>
+    <p:sldId id="274" r:id="rId22"/>
   </p:sldIdLst>
   <p:sldSz cx="12192000" cy="6858000"/>
   <p:notesSz cx="6858000" cy="9144000"/>
@@ -180,7 +182,7 @@
           <a:noFill/>
           <a:extLst>
             <a:ext uri="{909E8E84-426E-40dd-AFC4-6F175D3DCCD1}">
-              <a14:hiddenFill xmlns:a14="http://schemas.microsoft.com/office/drawing/2010/main" xmlns="">
+              <a14:hiddenFill xmlns="" xmlns:a14="http://schemas.microsoft.com/office/drawing/2010/main">
                 <a:solidFill>
                   <a:srgbClr val="FFFFFF"/>
                 </a:solidFill>
@@ -240,7 +242,7 @@
             </a:ln>
             <a:extLst>
               <a:ext uri="{91240B29-F687-4f45-9708-019B960494DF}">
-                <a14:hiddenLine xmlns:a14="http://schemas.microsoft.com/office/drawing/2010/main" xmlns="" w="9525">
+                <a14:hiddenLine xmlns="" xmlns:a14="http://schemas.microsoft.com/office/drawing/2010/main" w="9525">
                   <a:solidFill>
                     <a:srgbClr val="000000"/>
                   </a:solidFill>
@@ -330,7 +332,7 @@
             </a:ln>
             <a:extLst>
               <a:ext uri="{91240B29-F687-4f45-9708-019B960494DF}">
-                <a14:hiddenLine xmlns:a14="http://schemas.microsoft.com/office/drawing/2010/main" xmlns="" w="9525">
+                <a14:hiddenLine xmlns="" xmlns:a14="http://schemas.microsoft.com/office/drawing/2010/main" w="9525">
                   <a:solidFill>
                     <a:srgbClr val="000000"/>
                   </a:solidFill>
@@ -420,7 +422,7 @@
             </a:ln>
             <a:extLst>
               <a:ext uri="{91240B29-F687-4f45-9708-019B960494DF}">
-                <a14:hiddenLine xmlns:a14="http://schemas.microsoft.com/office/drawing/2010/main" xmlns="" w="9525">
+                <a14:hiddenLine xmlns="" xmlns:a14="http://schemas.microsoft.com/office/drawing/2010/main" w="9525">
                   <a:solidFill>
                     <a:srgbClr val="000000"/>
                   </a:solidFill>
@@ -454,7 +456,7 @@
             </a:ln>
             <a:extLst>
               <a:ext uri="{91240B29-F687-4f45-9708-019B960494DF}">
-                <a14:hiddenLine xmlns:a14="http://schemas.microsoft.com/office/drawing/2010/main" xmlns="" w="9525">
+                <a14:hiddenLine xmlns="" xmlns:a14="http://schemas.microsoft.com/office/drawing/2010/main" w="9525">
                   <a:solidFill>
                     <a:srgbClr val="000000"/>
                   </a:solidFill>
@@ -544,7 +546,7 @@
             </a:ln>
             <a:extLst>
               <a:ext uri="{91240B29-F687-4f45-9708-019B960494DF}">
-                <a14:hiddenLine xmlns:a14="http://schemas.microsoft.com/office/drawing/2010/main" xmlns="" w="9525">
+                <a14:hiddenLine xmlns="" xmlns:a14="http://schemas.microsoft.com/office/drawing/2010/main" w="9525">
                   <a:solidFill>
                     <a:srgbClr val="000000"/>
                   </a:solidFill>
@@ -606,7 +608,7 @@
             </a:ln>
             <a:extLst>
               <a:ext uri="{91240B29-F687-4f45-9708-019B960494DF}">
-                <a14:hiddenLine xmlns:a14="http://schemas.microsoft.com/office/drawing/2010/main" xmlns="" w="9525">
+                <a14:hiddenLine xmlns="" xmlns:a14="http://schemas.microsoft.com/office/drawing/2010/main" w="9525">
                   <a:solidFill>
                     <a:srgbClr val="000000"/>
                   </a:solidFill>
@@ -668,7 +670,7 @@
             </a:ln>
             <a:extLst>
               <a:ext uri="{91240B29-F687-4f45-9708-019B960494DF}">
-                <a14:hiddenLine xmlns:a14="http://schemas.microsoft.com/office/drawing/2010/main" xmlns="" w="9525">
+                <a14:hiddenLine xmlns="" xmlns:a14="http://schemas.microsoft.com/office/drawing/2010/main" w="9525">
                   <a:solidFill>
                     <a:srgbClr val="000000"/>
                   </a:solidFill>
@@ -758,7 +760,7 @@
             </a:ln>
             <a:extLst>
               <a:ext uri="{91240B29-F687-4f45-9708-019B960494DF}">
-                <a14:hiddenLine xmlns:a14="http://schemas.microsoft.com/office/drawing/2010/main" xmlns="" w="9525">
+                <a14:hiddenLine xmlns="" xmlns:a14="http://schemas.microsoft.com/office/drawing/2010/main" w="9525">
                   <a:solidFill>
                     <a:srgbClr val="000000"/>
                   </a:solidFill>
@@ -820,7 +822,7 @@
             </a:ln>
             <a:extLst>
               <a:ext uri="{91240B29-F687-4f45-9708-019B960494DF}">
-                <a14:hiddenLine xmlns:a14="http://schemas.microsoft.com/office/drawing/2010/main" xmlns="" w="9525">
+                <a14:hiddenLine xmlns="" xmlns:a14="http://schemas.microsoft.com/office/drawing/2010/main" w="9525">
                   <a:solidFill>
                     <a:srgbClr val="000000"/>
                   </a:solidFill>
@@ -882,7 +884,7 @@
             </a:ln>
             <a:extLst>
               <a:ext uri="{91240B29-F687-4f45-9708-019B960494DF}">
-                <a14:hiddenLine xmlns:a14="http://schemas.microsoft.com/office/drawing/2010/main" xmlns="" w="9525">
+                <a14:hiddenLine xmlns="" xmlns:a14="http://schemas.microsoft.com/office/drawing/2010/main" w="9525">
                   <a:solidFill>
                     <a:srgbClr val="000000"/>
                   </a:solidFill>
@@ -972,7 +974,7 @@
             </a:ln>
             <a:extLst>
               <a:ext uri="{91240B29-F687-4f45-9708-019B960494DF}">
-                <a14:hiddenLine xmlns:a14="http://schemas.microsoft.com/office/drawing/2010/main" xmlns="" w="9525">
+                <a14:hiddenLine xmlns="" xmlns:a14="http://schemas.microsoft.com/office/drawing/2010/main" w="9525">
                   <a:solidFill>
                     <a:srgbClr val="000000"/>
                   </a:solidFill>
@@ -1062,7 +1064,7 @@
             </a:ln>
             <a:extLst>
               <a:ext uri="{91240B29-F687-4f45-9708-019B960494DF}">
-                <a14:hiddenLine xmlns:a14="http://schemas.microsoft.com/office/drawing/2010/main" xmlns="" w="9525">
+                <a14:hiddenLine xmlns="" xmlns:a14="http://schemas.microsoft.com/office/drawing/2010/main" w="9525">
                   <a:solidFill>
                     <a:srgbClr val="000000"/>
                   </a:solidFill>
@@ -1124,7 +1126,7 @@
             </a:ln>
             <a:extLst>
               <a:ext uri="{91240B29-F687-4f45-9708-019B960494DF}">
-                <a14:hiddenLine xmlns:a14="http://schemas.microsoft.com/office/drawing/2010/main" xmlns="" w="9525">
+                <a14:hiddenLine xmlns="" xmlns:a14="http://schemas.microsoft.com/office/drawing/2010/main" w="9525">
                   <a:solidFill>
                     <a:srgbClr val="000000"/>
                   </a:solidFill>
@@ -1234,7 +1236,7 @@
             </a:ln>
             <a:extLst>
               <a:ext uri="{91240B29-F687-4f45-9708-019B960494DF}">
-                <a14:hiddenLine xmlns:a14="http://schemas.microsoft.com/office/drawing/2010/main" xmlns="" w="9525">
+                <a14:hiddenLine xmlns="" xmlns:a14="http://schemas.microsoft.com/office/drawing/2010/main" w="9525">
                   <a:solidFill>
                     <a:srgbClr val="000000"/>
                   </a:solidFill>
@@ -1296,7 +1298,7 @@
             </a:ln>
             <a:extLst>
               <a:ext uri="{91240B29-F687-4f45-9708-019B960494DF}">
-                <a14:hiddenLine xmlns:a14="http://schemas.microsoft.com/office/drawing/2010/main" xmlns="" w="9525">
+                <a14:hiddenLine xmlns="" xmlns:a14="http://schemas.microsoft.com/office/drawing/2010/main" w="9525">
                   <a:solidFill>
                     <a:srgbClr val="000000"/>
                   </a:solidFill>
@@ -1386,7 +1388,7 @@
             </a:ln>
             <a:extLst>
               <a:ext uri="{91240B29-F687-4f45-9708-019B960494DF}">
-                <a14:hiddenLine xmlns:a14="http://schemas.microsoft.com/office/drawing/2010/main" xmlns="" w="9525">
+                <a14:hiddenLine xmlns="" xmlns:a14="http://schemas.microsoft.com/office/drawing/2010/main" w="9525">
                   <a:solidFill>
                     <a:srgbClr val="000000"/>
                   </a:solidFill>
@@ -1476,7 +1478,7 @@
             </a:ln>
             <a:extLst>
               <a:ext uri="{91240B29-F687-4f45-9708-019B960494DF}">
-                <a14:hiddenLine xmlns:a14="http://schemas.microsoft.com/office/drawing/2010/main" xmlns="" w="9525">
+                <a14:hiddenLine xmlns="" xmlns:a14="http://schemas.microsoft.com/office/drawing/2010/main" w="9525">
                   <a:solidFill>
                     <a:srgbClr val="000000"/>
                   </a:solidFill>
@@ -1538,7 +1540,7 @@
             </a:ln>
             <a:extLst>
               <a:ext uri="{91240B29-F687-4f45-9708-019B960494DF}">
-                <a14:hiddenLine xmlns:a14="http://schemas.microsoft.com/office/drawing/2010/main" xmlns="" w="9525">
+                <a14:hiddenLine xmlns="" xmlns:a14="http://schemas.microsoft.com/office/drawing/2010/main" w="9525">
                   <a:solidFill>
                     <a:srgbClr val="000000"/>
                   </a:solidFill>
@@ -1628,7 +1630,7 @@
             </a:ln>
             <a:extLst>
               <a:ext uri="{91240B29-F687-4f45-9708-019B960494DF}">
-                <a14:hiddenLine xmlns:a14="http://schemas.microsoft.com/office/drawing/2010/main" xmlns="" w="9525">
+                <a14:hiddenLine xmlns="" xmlns:a14="http://schemas.microsoft.com/office/drawing/2010/main" w="9525">
                   <a:solidFill>
                     <a:srgbClr val="000000"/>
                   </a:solidFill>
@@ -1718,7 +1720,7 @@
             </a:ln>
             <a:extLst>
               <a:ext uri="{91240B29-F687-4f45-9708-019B960494DF}">
-                <a14:hiddenLine xmlns:a14="http://schemas.microsoft.com/office/drawing/2010/main" xmlns="" w="9525">
+                <a14:hiddenLine xmlns="" xmlns:a14="http://schemas.microsoft.com/office/drawing/2010/main" w="9525">
                   <a:solidFill>
                     <a:srgbClr val="000000"/>
                   </a:solidFill>
@@ -1774,7 +1776,7 @@
             </a:ln>
             <a:extLst>
               <a:ext uri="{91240B29-F687-4f45-9708-019B960494DF}">
-                <a14:hiddenLine xmlns:a14="http://schemas.microsoft.com/office/drawing/2010/main" xmlns="" w="9525">
+                <a14:hiddenLine xmlns="" xmlns:a14="http://schemas.microsoft.com/office/drawing/2010/main" w="9525">
                   <a:solidFill>
                     <a:srgbClr val="000000"/>
                   </a:solidFill>
@@ -1864,7 +1866,7 @@
             </a:ln>
             <a:extLst>
               <a:ext uri="{91240B29-F687-4f45-9708-019B960494DF}">
-                <a14:hiddenLine xmlns:a14="http://schemas.microsoft.com/office/drawing/2010/main" xmlns="" w="9525">
+                <a14:hiddenLine xmlns="" xmlns:a14="http://schemas.microsoft.com/office/drawing/2010/main" w="9525">
                   <a:solidFill>
                     <a:srgbClr val="000000"/>
                   </a:solidFill>
@@ -1920,7 +1922,7 @@
             </a:ln>
             <a:extLst>
               <a:ext uri="{91240B29-F687-4f45-9708-019B960494DF}">
-                <a14:hiddenLine xmlns:a14="http://schemas.microsoft.com/office/drawing/2010/main" xmlns="" w="9525">
+                <a14:hiddenLine xmlns="" xmlns:a14="http://schemas.microsoft.com/office/drawing/2010/main" w="9525">
                   <a:solidFill>
                     <a:srgbClr val="000000"/>
                   </a:solidFill>
@@ -2010,7 +2012,7 @@
             </a:ln>
             <a:extLst>
               <a:ext uri="{91240B29-F687-4f45-9708-019B960494DF}">
-                <a14:hiddenLine xmlns:a14="http://schemas.microsoft.com/office/drawing/2010/main" xmlns="" w="9525">
+                <a14:hiddenLine xmlns="" xmlns:a14="http://schemas.microsoft.com/office/drawing/2010/main" w="9525">
                   <a:solidFill>
                     <a:srgbClr val="000000"/>
                   </a:solidFill>
@@ -2078,7 +2080,7 @@
             </a:ln>
             <a:extLst>
               <a:ext uri="{91240B29-F687-4f45-9708-019B960494DF}">
-                <a14:hiddenLine xmlns:a14="http://schemas.microsoft.com/office/drawing/2010/main" xmlns="" w="9525">
+                <a14:hiddenLine xmlns="" xmlns:a14="http://schemas.microsoft.com/office/drawing/2010/main" w="9525">
                   <a:solidFill>
                     <a:srgbClr val="000000"/>
                   </a:solidFill>
@@ -2168,7 +2170,7 @@
             </a:ln>
             <a:extLst>
               <a:ext uri="{91240B29-F687-4f45-9708-019B960494DF}">
-                <a14:hiddenLine xmlns:a14="http://schemas.microsoft.com/office/drawing/2010/main" xmlns="" w="9525">
+                <a14:hiddenLine xmlns="" xmlns:a14="http://schemas.microsoft.com/office/drawing/2010/main" w="9525">
                   <a:solidFill>
                     <a:srgbClr val="000000"/>
                   </a:solidFill>
@@ -2236,7 +2238,7 @@
             </a:ln>
             <a:extLst>
               <a:ext uri="{91240B29-F687-4f45-9708-019B960494DF}">
-                <a14:hiddenLine xmlns:a14="http://schemas.microsoft.com/office/drawing/2010/main" xmlns="" w="9525">
+                <a14:hiddenLine xmlns="" xmlns:a14="http://schemas.microsoft.com/office/drawing/2010/main" w="9525">
                   <a:solidFill>
                     <a:srgbClr val="000000"/>
                   </a:solidFill>
@@ -2326,7 +2328,7 @@
             </a:ln>
             <a:extLst>
               <a:ext uri="{91240B29-F687-4f45-9708-019B960494DF}">
-                <a14:hiddenLine xmlns:a14="http://schemas.microsoft.com/office/drawing/2010/main" xmlns="" w="9525">
+                <a14:hiddenLine xmlns="" xmlns:a14="http://schemas.microsoft.com/office/drawing/2010/main" w="9525">
                   <a:solidFill>
                     <a:srgbClr val="000000"/>
                   </a:solidFill>
@@ -2360,7 +2362,7 @@
             </a:ln>
             <a:extLst>
               <a:ext uri="{91240B29-F687-4f45-9708-019B960494DF}">
-                <a14:hiddenLine xmlns:a14="http://schemas.microsoft.com/office/drawing/2010/main" xmlns="" w="9525">
+                <a14:hiddenLine xmlns="" xmlns:a14="http://schemas.microsoft.com/office/drawing/2010/main" w="9525">
                   <a:solidFill>
                     <a:srgbClr val="000000"/>
                   </a:solidFill>
@@ -2450,7 +2452,7 @@
             </a:ln>
             <a:extLst>
               <a:ext uri="{91240B29-F687-4f45-9708-019B960494DF}">
-                <a14:hiddenLine xmlns:a14="http://schemas.microsoft.com/office/drawing/2010/main" xmlns="" w="9525">
+                <a14:hiddenLine xmlns="" xmlns:a14="http://schemas.microsoft.com/office/drawing/2010/main" w="9525">
                   <a:solidFill>
                     <a:srgbClr val="000000"/>
                   </a:solidFill>
@@ -2512,7 +2514,7 @@
             </a:ln>
             <a:extLst>
               <a:ext uri="{91240B29-F687-4f45-9708-019B960494DF}">
-                <a14:hiddenLine xmlns:a14="http://schemas.microsoft.com/office/drawing/2010/main" xmlns="" w="9525">
+                <a14:hiddenLine xmlns="" xmlns:a14="http://schemas.microsoft.com/office/drawing/2010/main" w="9525">
                   <a:solidFill>
                     <a:srgbClr val="000000"/>
                   </a:solidFill>
@@ -2574,7 +2576,7 @@
             </a:ln>
             <a:extLst>
               <a:ext uri="{91240B29-F687-4f45-9708-019B960494DF}">
-                <a14:hiddenLine xmlns:a14="http://schemas.microsoft.com/office/drawing/2010/main" xmlns="" w="9525">
+                <a14:hiddenLine xmlns="" xmlns:a14="http://schemas.microsoft.com/office/drawing/2010/main" w="9525">
                   <a:solidFill>
                     <a:srgbClr val="000000"/>
                   </a:solidFill>
@@ -2664,7 +2666,7 @@
             </a:ln>
             <a:extLst>
               <a:ext uri="{91240B29-F687-4f45-9708-019B960494DF}">
-                <a14:hiddenLine xmlns:a14="http://schemas.microsoft.com/office/drawing/2010/main" xmlns="" w="9525">
+                <a14:hiddenLine xmlns="" xmlns:a14="http://schemas.microsoft.com/office/drawing/2010/main" w="9525">
                   <a:solidFill>
                     <a:srgbClr val="000000"/>
                   </a:solidFill>
@@ -2732,7 +2734,7 @@
             </a:ln>
             <a:extLst>
               <a:ext uri="{91240B29-F687-4f45-9708-019B960494DF}">
-                <a14:hiddenLine xmlns:a14="http://schemas.microsoft.com/office/drawing/2010/main" xmlns="" w="9525">
+                <a14:hiddenLine xmlns="" xmlns:a14="http://schemas.microsoft.com/office/drawing/2010/main" w="9525">
                   <a:solidFill>
                     <a:srgbClr val="000000"/>
                   </a:solidFill>
@@ -2794,7 +2796,7 @@
             </a:ln>
             <a:extLst>
               <a:ext uri="{91240B29-F687-4f45-9708-019B960494DF}">
-                <a14:hiddenLine xmlns:a14="http://schemas.microsoft.com/office/drawing/2010/main" xmlns="" w="9525">
+                <a14:hiddenLine xmlns="" xmlns:a14="http://schemas.microsoft.com/office/drawing/2010/main" w="9525">
                   <a:solidFill>
                     <a:srgbClr val="000000"/>
                   </a:solidFill>
@@ -2884,7 +2886,7 @@
             </a:ln>
             <a:extLst>
               <a:ext uri="{91240B29-F687-4f45-9708-019B960494DF}">
-                <a14:hiddenLine xmlns:a14="http://schemas.microsoft.com/office/drawing/2010/main" xmlns="" w="9525">
+                <a14:hiddenLine xmlns="" xmlns:a14="http://schemas.microsoft.com/office/drawing/2010/main" w="9525">
                   <a:solidFill>
                     <a:srgbClr val="000000"/>
                   </a:solidFill>
@@ -2946,7 +2948,7 @@
             </a:ln>
             <a:extLst>
               <a:ext uri="{91240B29-F687-4f45-9708-019B960494DF}">
-                <a14:hiddenLine xmlns:a14="http://schemas.microsoft.com/office/drawing/2010/main" xmlns="" w="9525">
+                <a14:hiddenLine xmlns="" xmlns:a14="http://schemas.microsoft.com/office/drawing/2010/main" w="9525">
                   <a:solidFill>
                     <a:srgbClr val="000000"/>
                   </a:solidFill>
@@ -3036,7 +3038,7 @@
             </a:ln>
             <a:extLst>
               <a:ext uri="{91240B29-F687-4f45-9708-019B960494DF}">
-                <a14:hiddenLine xmlns:a14="http://schemas.microsoft.com/office/drawing/2010/main" xmlns="" w="9525">
+                <a14:hiddenLine xmlns="" xmlns:a14="http://schemas.microsoft.com/office/drawing/2010/main" w="9525">
                   <a:solidFill>
                     <a:srgbClr val="000000"/>
                   </a:solidFill>
@@ -3098,7 +3100,7 @@
             </a:ln>
             <a:extLst>
               <a:ext uri="{91240B29-F687-4f45-9708-019B960494DF}">
-                <a14:hiddenLine xmlns:a14="http://schemas.microsoft.com/office/drawing/2010/main" xmlns="" w="9525">
+                <a14:hiddenLine xmlns="" xmlns:a14="http://schemas.microsoft.com/office/drawing/2010/main" w="9525">
                   <a:solidFill>
                     <a:srgbClr val="000000"/>
                   </a:solidFill>
@@ -3188,7 +3190,7 @@
             </a:ln>
             <a:extLst>
               <a:ext uri="{91240B29-F687-4f45-9708-019B960494DF}">
-                <a14:hiddenLine xmlns:a14="http://schemas.microsoft.com/office/drawing/2010/main" xmlns="" w="9525">
+                <a14:hiddenLine xmlns="" xmlns:a14="http://schemas.microsoft.com/office/drawing/2010/main" w="9525">
                   <a:solidFill>
                     <a:srgbClr val="000000"/>
                   </a:solidFill>
@@ -3222,7 +3224,7 @@
             </a:ln>
             <a:extLst>
               <a:ext uri="{91240B29-F687-4f45-9708-019B960494DF}">
-                <a14:hiddenLine xmlns:a14="http://schemas.microsoft.com/office/drawing/2010/main" xmlns="" w="9525">
+                <a14:hiddenLine xmlns="" xmlns:a14="http://schemas.microsoft.com/office/drawing/2010/main" w="9525">
                   <a:solidFill>
                     <a:srgbClr val="000000"/>
                   </a:solidFill>
@@ -3287,7 +3289,7 @@
             </a:ln>
             <a:extLst>
               <a:ext uri="{91240B29-F687-4f45-9708-019B960494DF}">
-                <a14:hiddenLine xmlns:a14="http://schemas.microsoft.com/office/drawing/2010/main" xmlns="" w="9525">
+                <a14:hiddenLine xmlns="" xmlns:a14="http://schemas.microsoft.com/office/drawing/2010/main" w="9525">
                   <a:solidFill>
                     <a:srgbClr val="000000"/>
                   </a:solidFill>
@@ -3377,7 +3379,7 @@
             </a:ln>
             <a:extLst>
               <a:ext uri="{91240B29-F687-4f45-9708-019B960494DF}">
-                <a14:hiddenLine xmlns:a14="http://schemas.microsoft.com/office/drawing/2010/main" xmlns="" w="9525">
+                <a14:hiddenLine xmlns="" xmlns:a14="http://schemas.microsoft.com/office/drawing/2010/main" w="9525">
                   <a:solidFill>
                     <a:srgbClr val="000000"/>
                   </a:solidFill>
@@ -3439,7 +3441,7 @@
             </a:ln>
             <a:extLst>
               <a:ext uri="{91240B29-F687-4f45-9708-019B960494DF}">
-                <a14:hiddenLine xmlns:a14="http://schemas.microsoft.com/office/drawing/2010/main" xmlns="" w="9525">
+                <a14:hiddenLine xmlns="" xmlns:a14="http://schemas.microsoft.com/office/drawing/2010/main" w="9525">
                   <a:solidFill>
                     <a:srgbClr val="000000"/>
                   </a:solidFill>
@@ -3529,7 +3531,7 @@
             </a:ln>
             <a:extLst>
               <a:ext uri="{91240B29-F687-4f45-9708-019B960494DF}">
-                <a14:hiddenLine xmlns:a14="http://schemas.microsoft.com/office/drawing/2010/main" xmlns="" w="9525">
+                <a14:hiddenLine xmlns="" xmlns:a14="http://schemas.microsoft.com/office/drawing/2010/main" w="9525">
                   <a:solidFill>
                     <a:srgbClr val="000000"/>
                   </a:solidFill>
@@ -3619,7 +3621,7 @@
             </a:ln>
             <a:extLst>
               <a:ext uri="{91240B29-F687-4f45-9708-019B960494DF}">
-                <a14:hiddenLine xmlns:a14="http://schemas.microsoft.com/office/drawing/2010/main" xmlns="" w="9525">
+                <a14:hiddenLine xmlns="" xmlns:a14="http://schemas.microsoft.com/office/drawing/2010/main" w="9525">
                   <a:solidFill>
                     <a:srgbClr val="000000"/>
                   </a:solidFill>
@@ -3684,7 +3686,7 @@
             </a:ln>
             <a:extLst>
               <a:ext uri="{91240B29-F687-4f45-9708-019B960494DF}">
-                <a14:hiddenLine xmlns:a14="http://schemas.microsoft.com/office/drawing/2010/main" xmlns="" w="9525">
+                <a14:hiddenLine xmlns="" xmlns:a14="http://schemas.microsoft.com/office/drawing/2010/main" w="9525">
                   <a:solidFill>
                     <a:srgbClr val="000000"/>
                   </a:solidFill>
@@ -3746,7 +3748,7 @@
             </a:ln>
             <a:extLst>
               <a:ext uri="{91240B29-F687-4f45-9708-019B960494DF}">
-                <a14:hiddenLine xmlns:a14="http://schemas.microsoft.com/office/drawing/2010/main" xmlns="" w="9525">
+                <a14:hiddenLine xmlns="" xmlns:a14="http://schemas.microsoft.com/office/drawing/2010/main" w="9525">
                   <a:solidFill>
                     <a:srgbClr val="000000"/>
                   </a:solidFill>
@@ -3836,7 +3838,7 @@
             </a:ln>
             <a:extLst>
               <a:ext uri="{91240B29-F687-4f45-9708-019B960494DF}">
-                <a14:hiddenLine xmlns:a14="http://schemas.microsoft.com/office/drawing/2010/main" xmlns="" w="9525">
+                <a14:hiddenLine xmlns="" xmlns:a14="http://schemas.microsoft.com/office/drawing/2010/main" w="9525">
                   <a:solidFill>
                     <a:srgbClr val="000000"/>
                   </a:solidFill>
@@ -3926,7 +3928,7 @@
             </a:ln>
             <a:extLst>
               <a:ext uri="{91240B29-F687-4f45-9708-019B960494DF}">
-                <a14:hiddenLine xmlns:a14="http://schemas.microsoft.com/office/drawing/2010/main" xmlns="" w="9525">
+                <a14:hiddenLine xmlns="" xmlns:a14="http://schemas.microsoft.com/office/drawing/2010/main" w="9525">
                   <a:solidFill>
                     <a:srgbClr val="000000"/>
                   </a:solidFill>
@@ -3988,7 +3990,7 @@
             </a:ln>
             <a:extLst>
               <a:ext uri="{91240B29-F687-4f45-9708-019B960494DF}">
-                <a14:hiddenLine xmlns:a14="http://schemas.microsoft.com/office/drawing/2010/main" xmlns="" w="9525">
+                <a14:hiddenLine xmlns="" xmlns:a14="http://schemas.microsoft.com/office/drawing/2010/main" w="9525">
                   <a:solidFill>
                     <a:srgbClr val="000000"/>
                   </a:solidFill>
@@ -4108,7 +4110,7 @@
             </a:ln>
             <a:extLst>
               <a:ext uri="{91240B29-F687-4f45-9708-019B960494DF}">
-                <a14:hiddenLine xmlns:a14="http://schemas.microsoft.com/office/drawing/2010/main" xmlns="" w="9525">
+                <a14:hiddenLine xmlns="" xmlns:a14="http://schemas.microsoft.com/office/drawing/2010/main" w="9525">
                   <a:solidFill>
                     <a:srgbClr val="000000"/>
                   </a:solidFill>
@@ -4176,7 +4178,7 @@
             </a:ln>
             <a:extLst>
               <a:ext uri="{91240B29-F687-4f45-9708-019B960494DF}">
-                <a14:hiddenLine xmlns:a14="http://schemas.microsoft.com/office/drawing/2010/main" xmlns="" w="9525">
+                <a14:hiddenLine xmlns="" xmlns:a14="http://schemas.microsoft.com/office/drawing/2010/main" w="9525">
                   <a:solidFill>
                     <a:srgbClr val="000000"/>
                   </a:solidFill>
@@ -4266,7 +4268,7 @@
             </a:ln>
             <a:extLst>
               <a:ext uri="{91240B29-F687-4f45-9708-019B960494DF}">
-                <a14:hiddenLine xmlns:a14="http://schemas.microsoft.com/office/drawing/2010/main" xmlns="" w="9525">
+                <a14:hiddenLine xmlns="" xmlns:a14="http://schemas.microsoft.com/office/drawing/2010/main" w="9525">
                   <a:solidFill>
                     <a:srgbClr val="000000"/>
                   </a:solidFill>
@@ -9073,7 +9075,7 @@
           <a:noFill/>
           <a:extLst>
             <a:ext uri="{909E8E84-426E-40dd-AFC4-6F175D3DCCD1}">
-              <a14:hiddenFill xmlns:a14="http://schemas.microsoft.com/office/drawing/2010/main" xmlns="">
+              <a14:hiddenFill xmlns="" xmlns:a14="http://schemas.microsoft.com/office/drawing/2010/main">
                 <a:solidFill>
                   <a:srgbClr val="FFFFFF"/>
                 </a:solidFill>
@@ -9147,7 +9149,7 @@
               </a:ln>
               <a:extLst>
                 <a:ext uri="{91240B29-F687-4f45-9708-019B960494DF}">
-                  <a14:hiddenLine xmlns:a14="http://schemas.microsoft.com/office/drawing/2010/main" xmlns="" w="9525">
+                  <a14:hiddenLine xmlns="" xmlns:a14="http://schemas.microsoft.com/office/drawing/2010/main" w="9525">
                     <a:solidFill>
                       <a:srgbClr val="000000"/>
                     </a:solidFill>
@@ -9237,7 +9239,7 @@
               </a:ln>
               <a:extLst>
                 <a:ext uri="{91240B29-F687-4f45-9708-019B960494DF}">
-                  <a14:hiddenLine xmlns:a14="http://schemas.microsoft.com/office/drawing/2010/main" xmlns="" w="9525">
+                  <a14:hiddenLine xmlns="" xmlns:a14="http://schemas.microsoft.com/office/drawing/2010/main" w="9525">
                     <a:solidFill>
                       <a:srgbClr val="000000"/>
                     </a:solidFill>
@@ -9327,7 +9329,7 @@
               </a:ln>
               <a:extLst>
                 <a:ext uri="{91240B29-F687-4f45-9708-019B960494DF}">
-                  <a14:hiddenLine xmlns:a14="http://schemas.microsoft.com/office/drawing/2010/main" xmlns="" w="9525">
+                  <a14:hiddenLine xmlns="" xmlns:a14="http://schemas.microsoft.com/office/drawing/2010/main" w="9525">
                     <a:solidFill>
                       <a:srgbClr val="000000"/>
                     </a:solidFill>
@@ -9389,7 +9391,7 @@
               </a:ln>
               <a:extLst>
                 <a:ext uri="{91240B29-F687-4f45-9708-019B960494DF}">
-                  <a14:hiddenLine xmlns:a14="http://schemas.microsoft.com/office/drawing/2010/main" xmlns="" w="9525">
+                  <a14:hiddenLine xmlns="" xmlns:a14="http://schemas.microsoft.com/office/drawing/2010/main" w="9525">
                     <a:solidFill>
                       <a:srgbClr val="000000"/>
                     </a:solidFill>
@@ -9479,7 +9481,7 @@
               </a:ln>
               <a:extLst>
                 <a:ext uri="{91240B29-F687-4f45-9708-019B960494DF}">
-                  <a14:hiddenLine xmlns:a14="http://schemas.microsoft.com/office/drawing/2010/main" xmlns="" w="9525">
+                  <a14:hiddenLine xmlns="" xmlns:a14="http://schemas.microsoft.com/office/drawing/2010/main" w="9525">
                     <a:solidFill>
                       <a:srgbClr val="000000"/>
                     </a:solidFill>
@@ -9541,7 +9543,7 @@
               </a:ln>
               <a:extLst>
                 <a:ext uri="{91240B29-F687-4f45-9708-019B960494DF}">
-                  <a14:hiddenLine xmlns:a14="http://schemas.microsoft.com/office/drawing/2010/main" xmlns="" w="9525">
+                  <a14:hiddenLine xmlns="" xmlns:a14="http://schemas.microsoft.com/office/drawing/2010/main" w="9525">
                     <a:solidFill>
                       <a:srgbClr val="000000"/>
                     </a:solidFill>
@@ -9603,7 +9605,7 @@
               </a:ln>
               <a:extLst>
                 <a:ext uri="{91240B29-F687-4f45-9708-019B960494DF}">
-                  <a14:hiddenLine xmlns:a14="http://schemas.microsoft.com/office/drawing/2010/main" xmlns="" w="9525">
+                  <a14:hiddenLine xmlns="" xmlns:a14="http://schemas.microsoft.com/office/drawing/2010/main" w="9525">
                     <a:solidFill>
                       <a:srgbClr val="000000"/>
                     </a:solidFill>
@@ -9693,7 +9695,7 @@
               </a:ln>
               <a:extLst>
                 <a:ext uri="{91240B29-F687-4f45-9708-019B960494DF}">
-                  <a14:hiddenLine xmlns:a14="http://schemas.microsoft.com/office/drawing/2010/main" xmlns="" w="9525">
+                  <a14:hiddenLine xmlns="" xmlns:a14="http://schemas.microsoft.com/office/drawing/2010/main" w="9525">
                     <a:solidFill>
                       <a:srgbClr val="000000"/>
                     </a:solidFill>
@@ -9783,7 +9785,7 @@
               </a:ln>
               <a:extLst>
                 <a:ext uri="{91240B29-F687-4f45-9708-019B960494DF}">
-                  <a14:hiddenLine xmlns:a14="http://schemas.microsoft.com/office/drawing/2010/main" xmlns="" w="9525">
+                  <a14:hiddenLine xmlns="" xmlns:a14="http://schemas.microsoft.com/office/drawing/2010/main" w="9525">
                     <a:solidFill>
                       <a:srgbClr val="000000"/>
                     </a:solidFill>
@@ -9845,7 +9847,7 @@
               </a:ln>
               <a:extLst>
                 <a:ext uri="{91240B29-F687-4f45-9708-019B960494DF}">
-                  <a14:hiddenLine xmlns:a14="http://schemas.microsoft.com/office/drawing/2010/main" xmlns="" w="9525">
+                  <a14:hiddenLine xmlns="" xmlns:a14="http://schemas.microsoft.com/office/drawing/2010/main" w="9525">
                     <a:solidFill>
                       <a:srgbClr val="000000"/>
                     </a:solidFill>
@@ -9955,7 +9957,7 @@
               </a:ln>
               <a:extLst>
                 <a:ext uri="{91240B29-F687-4f45-9708-019B960494DF}">
-                  <a14:hiddenLine xmlns:a14="http://schemas.microsoft.com/office/drawing/2010/main" xmlns="" w="9525">
+                  <a14:hiddenLine xmlns="" xmlns:a14="http://schemas.microsoft.com/office/drawing/2010/main" w="9525">
                     <a:solidFill>
                       <a:srgbClr val="000000"/>
                     </a:solidFill>
@@ -10039,7 +10041,7 @@
               </a:ln>
               <a:extLst>
                 <a:ext uri="{91240B29-F687-4f45-9708-019B960494DF}">
-                  <a14:hiddenLine xmlns:a14="http://schemas.microsoft.com/office/drawing/2010/main" xmlns="" w="9525">
+                  <a14:hiddenLine xmlns="" xmlns:a14="http://schemas.microsoft.com/office/drawing/2010/main" w="9525">
                     <a:solidFill>
                       <a:srgbClr val="000000"/>
                     </a:solidFill>
@@ -10101,7 +10103,7 @@
               </a:ln>
               <a:extLst>
                 <a:ext uri="{91240B29-F687-4f45-9708-019B960494DF}">
-                  <a14:hiddenLine xmlns:a14="http://schemas.microsoft.com/office/drawing/2010/main" xmlns="" w="9525">
+                  <a14:hiddenLine xmlns="" xmlns:a14="http://schemas.microsoft.com/office/drawing/2010/main" w="9525">
                     <a:solidFill>
                       <a:srgbClr val="000000"/>
                     </a:solidFill>
@@ -10163,7 +10165,7 @@
               </a:ln>
               <a:extLst>
                 <a:ext uri="{91240B29-F687-4f45-9708-019B960494DF}">
-                  <a14:hiddenLine xmlns:a14="http://schemas.microsoft.com/office/drawing/2010/main" xmlns="" w="9525">
+                  <a14:hiddenLine xmlns="" xmlns:a14="http://schemas.microsoft.com/office/drawing/2010/main" w="9525">
                     <a:solidFill>
                       <a:srgbClr val="000000"/>
                     </a:solidFill>
@@ -10253,7 +10255,7 @@
               </a:ln>
               <a:extLst>
                 <a:ext uri="{91240B29-F687-4f45-9708-019B960494DF}">
-                  <a14:hiddenLine xmlns:a14="http://schemas.microsoft.com/office/drawing/2010/main" xmlns="" w="9525">
+                  <a14:hiddenLine xmlns="" xmlns:a14="http://schemas.microsoft.com/office/drawing/2010/main" w="9525">
                     <a:solidFill>
                       <a:srgbClr val="000000"/>
                     </a:solidFill>
@@ -10287,7 +10289,7 @@
               </a:ln>
               <a:extLst>
                 <a:ext uri="{91240B29-F687-4f45-9708-019B960494DF}">
-                  <a14:hiddenLine xmlns:a14="http://schemas.microsoft.com/office/drawing/2010/main" xmlns="" w="9525">
+                  <a14:hiddenLine xmlns="" xmlns:a14="http://schemas.microsoft.com/office/drawing/2010/main" w="9525">
                     <a:solidFill>
                       <a:srgbClr val="000000"/>
                     </a:solidFill>
@@ -10352,7 +10354,7 @@
               </a:ln>
               <a:extLst>
                 <a:ext uri="{91240B29-F687-4f45-9708-019B960494DF}">
-                  <a14:hiddenLine xmlns:a14="http://schemas.microsoft.com/office/drawing/2010/main" xmlns="" w="9525">
+                  <a14:hiddenLine xmlns="" xmlns:a14="http://schemas.microsoft.com/office/drawing/2010/main" w="9525">
                     <a:solidFill>
                       <a:srgbClr val="000000"/>
                     </a:solidFill>
@@ -10442,7 +10444,7 @@
               </a:ln>
               <a:extLst>
                 <a:ext uri="{91240B29-F687-4f45-9708-019B960494DF}">
-                  <a14:hiddenLine xmlns:a14="http://schemas.microsoft.com/office/drawing/2010/main" xmlns="" w="9525">
+                  <a14:hiddenLine xmlns="" xmlns:a14="http://schemas.microsoft.com/office/drawing/2010/main" w="9525">
                     <a:solidFill>
                       <a:srgbClr val="000000"/>
                     </a:solidFill>
@@ -10504,7 +10506,7 @@
               </a:ln>
               <a:extLst>
                 <a:ext uri="{91240B29-F687-4f45-9708-019B960494DF}">
-                  <a14:hiddenLine xmlns:a14="http://schemas.microsoft.com/office/drawing/2010/main" xmlns="" w="9525">
+                  <a14:hiddenLine xmlns="" xmlns:a14="http://schemas.microsoft.com/office/drawing/2010/main" w="9525">
                     <a:solidFill>
                       <a:srgbClr val="000000"/>
                     </a:solidFill>
@@ -10594,7 +10596,7 @@
               </a:ln>
               <a:extLst>
                 <a:ext uri="{91240B29-F687-4f45-9708-019B960494DF}">
-                  <a14:hiddenLine xmlns:a14="http://schemas.microsoft.com/office/drawing/2010/main" xmlns="" w="9525">
+                  <a14:hiddenLine xmlns="" xmlns:a14="http://schemas.microsoft.com/office/drawing/2010/main" w="9525">
                     <a:solidFill>
                       <a:srgbClr val="000000"/>
                     </a:solidFill>
@@ -10659,7 +10661,7 @@
               </a:ln>
               <a:extLst>
                 <a:ext uri="{91240B29-F687-4f45-9708-019B960494DF}">
-                  <a14:hiddenLine xmlns:a14="http://schemas.microsoft.com/office/drawing/2010/main" xmlns="" w="9525">
+                  <a14:hiddenLine xmlns="" xmlns:a14="http://schemas.microsoft.com/office/drawing/2010/main" w="9525">
                     <a:solidFill>
                       <a:srgbClr val="000000"/>
                     </a:solidFill>
@@ -10721,7 +10723,7 @@
               </a:ln>
               <a:extLst>
                 <a:ext uri="{91240B29-F687-4f45-9708-019B960494DF}">
-                  <a14:hiddenLine xmlns:a14="http://schemas.microsoft.com/office/drawing/2010/main" xmlns="" w="9525">
+                  <a14:hiddenLine xmlns="" xmlns:a14="http://schemas.microsoft.com/office/drawing/2010/main" w="9525">
                     <a:solidFill>
                       <a:srgbClr val="000000"/>
                     </a:solidFill>
@@ -10811,7 +10813,7 @@
               </a:ln>
               <a:extLst>
                 <a:ext uri="{91240B29-F687-4f45-9708-019B960494DF}">
-                  <a14:hiddenLine xmlns:a14="http://schemas.microsoft.com/office/drawing/2010/main" xmlns="" w="9525">
+                  <a14:hiddenLine xmlns="" xmlns:a14="http://schemas.microsoft.com/office/drawing/2010/main" w="9525">
                     <a:solidFill>
                       <a:srgbClr val="000000"/>
                     </a:solidFill>
@@ -10901,7 +10903,7 @@
               </a:ln>
               <a:extLst>
                 <a:ext uri="{91240B29-F687-4f45-9708-019B960494DF}">
-                  <a14:hiddenLine xmlns:a14="http://schemas.microsoft.com/office/drawing/2010/main" xmlns="" w="9525">
+                  <a14:hiddenLine xmlns="" xmlns:a14="http://schemas.microsoft.com/office/drawing/2010/main" w="9525">
                     <a:solidFill>
                       <a:srgbClr val="000000"/>
                     </a:solidFill>
@@ -10966,7 +10968,7 @@
               </a:ln>
               <a:extLst>
                 <a:ext uri="{91240B29-F687-4f45-9708-019B960494DF}">
-                  <a14:hiddenLine xmlns:a14="http://schemas.microsoft.com/office/drawing/2010/main" xmlns="" w="9525">
+                  <a14:hiddenLine xmlns="" xmlns:a14="http://schemas.microsoft.com/office/drawing/2010/main" w="9525">
                     <a:solidFill>
                       <a:srgbClr val="000000"/>
                     </a:solidFill>
@@ -11086,7 +11088,7 @@
               </a:ln>
               <a:extLst>
                 <a:ext uri="{91240B29-F687-4f45-9708-019B960494DF}">
-                  <a14:hiddenLine xmlns:a14="http://schemas.microsoft.com/office/drawing/2010/main" xmlns="" w="9525">
+                  <a14:hiddenLine xmlns="" xmlns:a14="http://schemas.microsoft.com/office/drawing/2010/main" w="9525">
                     <a:solidFill>
                       <a:srgbClr val="000000"/>
                     </a:solidFill>
@@ -11184,7 +11186,7 @@
               </a:ln>
               <a:extLst>
                 <a:ext uri="{91240B29-F687-4f45-9708-019B960494DF}">
-                  <a14:hiddenLine xmlns:a14="http://schemas.microsoft.com/office/drawing/2010/main" xmlns="" w="9525">
+                  <a14:hiddenLine xmlns="" xmlns:a14="http://schemas.microsoft.com/office/drawing/2010/main" w="9525">
                     <a:solidFill>
                       <a:srgbClr val="000000"/>
                     </a:solidFill>
@@ -11299,7 +11301,7 @@
               </a:ln>
               <a:extLst>
                 <a:ext uri="{91240B29-F687-4f45-9708-019B960494DF}">
-                  <a14:hiddenLine xmlns:a14="http://schemas.microsoft.com/office/drawing/2010/main" xmlns="" w="9525">
+                  <a14:hiddenLine xmlns="" xmlns:a14="http://schemas.microsoft.com/office/drawing/2010/main" w="9525">
                     <a:solidFill>
                       <a:srgbClr val="000000"/>
                     </a:solidFill>
@@ -11389,7 +11391,7 @@
               </a:ln>
               <a:extLst>
                 <a:ext uri="{91240B29-F687-4f45-9708-019B960494DF}">
-                  <a14:hiddenLine xmlns:a14="http://schemas.microsoft.com/office/drawing/2010/main" xmlns="" w="9525">
+                  <a14:hiddenLine xmlns="" xmlns:a14="http://schemas.microsoft.com/office/drawing/2010/main" w="9525">
                     <a:solidFill>
                       <a:srgbClr val="000000"/>
                     </a:solidFill>
@@ -11454,7 +11456,7 @@
               </a:ln>
               <a:extLst>
                 <a:ext uri="{91240B29-F687-4f45-9708-019B960494DF}">
-                  <a14:hiddenLine xmlns:a14="http://schemas.microsoft.com/office/drawing/2010/main" xmlns="" w="9525">
+                  <a14:hiddenLine xmlns="" xmlns:a14="http://schemas.microsoft.com/office/drawing/2010/main" w="9525">
                     <a:solidFill>
                       <a:srgbClr val="000000"/>
                     </a:solidFill>
@@ -11544,7 +11546,7 @@
               </a:ln>
               <a:extLst>
                 <a:ext uri="{91240B29-F687-4f45-9708-019B960494DF}">
-                  <a14:hiddenLine xmlns:a14="http://schemas.microsoft.com/office/drawing/2010/main" xmlns="" w="9525">
+                  <a14:hiddenLine xmlns="" xmlns:a14="http://schemas.microsoft.com/office/drawing/2010/main" w="9525">
                     <a:solidFill>
                       <a:srgbClr val="000000"/>
                     </a:solidFill>
@@ -11612,7 +11614,7 @@
               </a:ln>
               <a:extLst>
                 <a:ext uri="{91240B29-F687-4f45-9708-019B960494DF}">
-                  <a14:hiddenLine xmlns:a14="http://schemas.microsoft.com/office/drawing/2010/main" xmlns="" w="9525">
+                  <a14:hiddenLine xmlns="" xmlns:a14="http://schemas.microsoft.com/office/drawing/2010/main" w="9525">
                     <a:solidFill>
                       <a:srgbClr val="000000"/>
                     </a:solidFill>
@@ -11702,7 +11704,7 @@
               </a:ln>
               <a:extLst>
                 <a:ext uri="{91240B29-F687-4f45-9708-019B960494DF}">
-                  <a14:hiddenLine xmlns:a14="http://schemas.microsoft.com/office/drawing/2010/main" xmlns="" w="9525">
+                  <a14:hiddenLine xmlns="" xmlns:a14="http://schemas.microsoft.com/office/drawing/2010/main" w="9525">
                     <a:solidFill>
                       <a:srgbClr val="000000"/>
                     </a:solidFill>
@@ -11770,7 +11772,7 @@
               </a:ln>
               <a:extLst>
                 <a:ext uri="{91240B29-F687-4f45-9708-019B960494DF}">
-                  <a14:hiddenLine xmlns:a14="http://schemas.microsoft.com/office/drawing/2010/main" xmlns="" w="9525">
+                  <a14:hiddenLine xmlns="" xmlns:a14="http://schemas.microsoft.com/office/drawing/2010/main" w="9525">
                     <a:solidFill>
                       <a:srgbClr val="000000"/>
                     </a:solidFill>
@@ -11860,7 +11862,7 @@
               </a:ln>
               <a:extLst>
                 <a:ext uri="{91240B29-F687-4f45-9708-019B960494DF}">
-                  <a14:hiddenLine xmlns:a14="http://schemas.microsoft.com/office/drawing/2010/main" xmlns="" w="9525">
+                  <a14:hiddenLine xmlns="" xmlns:a14="http://schemas.microsoft.com/office/drawing/2010/main" w="9525">
                     <a:solidFill>
                       <a:srgbClr val="000000"/>
                     </a:solidFill>
@@ -11894,7 +11896,7 @@
               </a:ln>
               <a:extLst>
                 <a:ext uri="{91240B29-F687-4f45-9708-019B960494DF}">
-                  <a14:hiddenLine xmlns:a14="http://schemas.microsoft.com/office/drawing/2010/main" xmlns="" w="9525">
+                  <a14:hiddenLine xmlns="" xmlns:a14="http://schemas.microsoft.com/office/drawing/2010/main" w="9525">
                     <a:solidFill>
                       <a:srgbClr val="000000"/>
                     </a:solidFill>
@@ -12851,8 +12853,12 @@
           <a:p>
             <a:pPr algn="ctr"/>
             <a:r>
-              <a:rPr lang="bg-BG" dirty="0"/>
-              <a:t>задача</a:t>
+              <a:rPr lang="bg-BG" dirty="0" smtClean="0"/>
+              <a:t>Променлив Брой параметри в </a:t>
+            </a:r>
+            <a:r>
+              <a:rPr lang="en-US" dirty="0" smtClean="0"/>
+              <a:t>JAVA</a:t>
             </a:r>
             <a:endParaRPr lang="en-US" dirty="0"/>
           </a:p>
@@ -12870,85 +12876,32 @@
         </p:nvSpPr>
         <p:spPr/>
         <p:txBody>
-          <a:bodyPr>
-            <a:normAutofit/>
-          </a:bodyPr>
+          <a:bodyPr/>
           <a:lstStyle/>
           <a:p>
             <a:r>
-              <a:rPr lang="bg-BG" dirty="0"/>
-              <a:t>С помощта на функции в </a:t>
-            </a:r>
-            <a:r>
-              <a:rPr lang="en-US" dirty="0" smtClean="0"/>
-              <a:t>JAVA </a:t>
-            </a:r>
-            <a:r>
               <a:rPr lang="bg-BG" dirty="0" smtClean="0"/>
-              <a:t>направете </a:t>
-            </a:r>
-            <a:r>
-              <a:rPr lang="bg-BG" dirty="0"/>
-              <a:t>програма, която пресмята лицето на триъгълник по зададена страна и височина към нея. (</a:t>
-            </a:r>
-            <a:r>
-              <a:rPr lang="en-US" dirty="0"/>
-              <a:t>S=</a:t>
-            </a:r>
-            <a:r>
-              <a:rPr lang="en-US" dirty="0" err="1"/>
-              <a:t>a.ha</a:t>
-            </a:r>
-            <a:r>
-              <a:rPr lang="en-US" dirty="0"/>
-              <a:t>/2</a:t>
-            </a:r>
-            <a:r>
-              <a:rPr lang="bg-BG" dirty="0"/>
-              <a:t>)</a:t>
-            </a:r>
-            <a:r>
-              <a:rPr lang="en-US" dirty="0"/>
-              <a:t>. </a:t>
-            </a:r>
-            <a:r>
-              <a:rPr lang="bg-BG" dirty="0"/>
-              <a:t>На случаен принцип генерирайте 10 различни страни и съответно височини към тях и изведете лицето на образувания от тях триъгълник на </a:t>
-            </a:r>
+              <a:t>Една функция може да приема променлив брой параметри</a:t>
+            </a:r>
+          </a:p>
+          <a:p>
             <a:r>
               <a:rPr lang="bg-BG" dirty="0" smtClean="0"/>
-              <a:t>екрана</a:t>
-            </a:r>
-            <a:endParaRPr lang="en-US" dirty="0" smtClean="0"/>
-          </a:p>
-          <a:p>
-            <a:pPr marL="0" indent="0">
-              <a:buNone/>
-            </a:pPr>
+              <a:t>Параметрите трябва да са от един и съши тип</a:t>
+            </a:r>
+          </a:p>
+          <a:p>
             <a:r>
               <a:rPr lang="bg-BG" dirty="0" smtClean="0"/>
-              <a:t>Дефинирайте функция за пресмятането на лицето</a:t>
-            </a:r>
-          </a:p>
-          <a:p>
-            <a:pPr marL="0" indent="0">
-              <a:buNone/>
-            </a:pPr>
-            <a:r>
-              <a:rPr lang="bg-BG" dirty="0" smtClean="0"/>
-              <a:t>Дефинирайте функция за извеждането на страната, височината и лицето</a:t>
-            </a:r>
-            <a:endParaRPr lang="en-US" dirty="0" smtClean="0"/>
-          </a:p>
-          <a:p>
-            <a:endParaRPr lang="bg-BG" dirty="0"/>
+              <a:t>Параметрите се обхождат като масив</a:t>
+            </a:r>
           </a:p>
         </p:txBody>
       </p:sp>
     </p:spTree>
     <p:extLst>
       <p:ext uri="{BB962C8B-B14F-4D97-AF65-F5344CB8AC3E}">
-        <p14:creationId xmlns:p14="http://schemas.microsoft.com/office/powerpoint/2010/main" val="1168828631"/>
+        <p14:creationId xmlns:p14="http://schemas.microsoft.com/office/powerpoint/2010/main" val="3116970692"/>
       </p:ext>
     </p:extLst>
   </p:cSld>
@@ -12992,6 +12945,250 @@
           <a:p>
             <a:pPr algn="ctr"/>
             <a:r>
+              <a:rPr lang="bg-BG" dirty="0"/>
+              <a:t>Променлив Брой параметри в </a:t>
+            </a:r>
+            <a:r>
+              <a:rPr lang="en-US" dirty="0" smtClean="0"/>
+              <a:t>JAVA</a:t>
+            </a:r>
+            <a:r>
+              <a:rPr lang="bg-BG" dirty="0" smtClean="0"/>
+              <a:t> ДЕМО</a:t>
+            </a:r>
+            <a:endParaRPr lang="en-US" dirty="0"/>
+          </a:p>
+        </p:txBody>
+      </p:sp>
+      <p:pic>
+        <p:nvPicPr>
+          <p:cNvPr id="1026" name="Picture 2" descr="https://cdn3.iconfinder.com/data/icons/linecons-free-vector-icons-pack/32/params-512.png"/>
+          <p:cNvPicPr>
+            <a:picLocks noChangeAspect="1" noChangeArrowheads="1"/>
+          </p:cNvPicPr>
+          <p:nvPr/>
+        </p:nvPicPr>
+        <p:blipFill>
+          <a:blip r:embed="rId2">
+            <a:extLst>
+              <a:ext uri="{28A0092B-C50C-407E-A947-70E740481C1C}">
+                <a14:useLocalDpi xmlns:a14="http://schemas.microsoft.com/office/drawing/2010/main" val="0"/>
+              </a:ext>
+            </a:extLst>
+          </a:blip>
+          <a:srcRect/>
+          <a:stretch>
+            <a:fillRect/>
+          </a:stretch>
+        </p:blipFill>
+        <p:spPr bwMode="auto">
+          <a:xfrm>
+            <a:off x="4428589" y="2097088"/>
+            <a:ext cx="3331646" cy="3331647"/>
+          </a:xfrm>
+          <a:prstGeom prst="rect">
+            <a:avLst/>
+          </a:prstGeom>
+          <a:noFill/>
+          <a:extLst>
+            <a:ext uri="{909E8E84-426E-40DD-AFC4-6F175D3DCCD1}">
+              <a14:hiddenFill xmlns:a14="http://schemas.microsoft.com/office/drawing/2010/main">
+                <a:solidFill>
+                  <a:srgbClr val="FFFFFF"/>
+                </a:solidFill>
+              </a14:hiddenFill>
+            </a:ext>
+          </a:extLst>
+        </p:spPr>
+      </p:pic>
+    </p:spTree>
+    <p:extLst>
+      <p:ext uri="{BB962C8B-B14F-4D97-AF65-F5344CB8AC3E}">
+        <p14:creationId xmlns:p14="http://schemas.microsoft.com/office/powerpoint/2010/main" val="3657395945"/>
+      </p:ext>
+    </p:extLst>
+  </p:cSld>
+  <p:clrMapOvr>
+    <a:masterClrMapping/>
+  </p:clrMapOvr>
+</p:sld>
+</file>
+
+<file path=ppt/slides/slide15.xml><?xml version="1.0" encoding="utf-8"?>
+<p:sld xmlns:a="http://schemas.openxmlformats.org/drawingml/2006/main" xmlns:r="http://schemas.openxmlformats.org/officeDocument/2006/relationships" xmlns:p="http://schemas.openxmlformats.org/presentationml/2006/main">
+  <p:cSld>
+    <p:spTree>
+      <p:nvGrpSpPr>
+        <p:cNvPr id="1" name=""/>
+        <p:cNvGrpSpPr/>
+        <p:nvPr/>
+      </p:nvGrpSpPr>
+      <p:grpSpPr>
+        <a:xfrm>
+          <a:off x="0" y="0"/>
+          <a:ext cx="0" cy="0"/>
+          <a:chOff x="0" y="0"/>
+          <a:chExt cx="0" cy="0"/>
+        </a:xfrm>
+      </p:grpSpPr>
+      <p:sp>
+        <p:nvSpPr>
+          <p:cNvPr id="2" name="Title 1"/>
+          <p:cNvSpPr>
+            <a:spLocks noGrp="1"/>
+          </p:cNvSpPr>
+          <p:nvPr>
+            <p:ph type="title"/>
+          </p:nvPr>
+        </p:nvSpPr>
+        <p:spPr/>
+        <p:txBody>
+          <a:bodyPr/>
+          <a:lstStyle/>
+          <a:p>
+            <a:pPr algn="ctr"/>
+            <a:r>
+              <a:rPr lang="bg-BG" dirty="0"/>
+              <a:t>задача</a:t>
+            </a:r>
+            <a:endParaRPr lang="en-US" dirty="0"/>
+          </a:p>
+        </p:txBody>
+      </p:sp>
+      <p:sp>
+        <p:nvSpPr>
+          <p:cNvPr id="3" name="Content Placeholder 2"/>
+          <p:cNvSpPr>
+            <a:spLocks noGrp="1"/>
+          </p:cNvSpPr>
+          <p:nvPr>
+            <p:ph idx="1"/>
+          </p:nvPr>
+        </p:nvSpPr>
+        <p:spPr/>
+        <p:txBody>
+          <a:bodyPr>
+            <a:normAutofit/>
+          </a:bodyPr>
+          <a:lstStyle/>
+          <a:p>
+            <a:r>
+              <a:rPr lang="bg-BG" dirty="0"/>
+              <a:t>С помощта на функции в </a:t>
+            </a:r>
+            <a:r>
+              <a:rPr lang="en-US" dirty="0" smtClean="0"/>
+              <a:t>JAVA </a:t>
+            </a:r>
+            <a:r>
+              <a:rPr lang="bg-BG" dirty="0" smtClean="0"/>
+              <a:t>направете </a:t>
+            </a:r>
+            <a:r>
+              <a:rPr lang="bg-BG" dirty="0"/>
+              <a:t>програма, която пресмята лицето на триъгълник по зададена страна и височина към нея. (</a:t>
+            </a:r>
+            <a:r>
+              <a:rPr lang="en-US" dirty="0"/>
+              <a:t>S=</a:t>
+            </a:r>
+            <a:r>
+              <a:rPr lang="en-US" dirty="0" err="1"/>
+              <a:t>a.ha</a:t>
+            </a:r>
+            <a:r>
+              <a:rPr lang="en-US" dirty="0"/>
+              <a:t>/2</a:t>
+            </a:r>
+            <a:r>
+              <a:rPr lang="bg-BG" dirty="0"/>
+              <a:t>)</a:t>
+            </a:r>
+            <a:r>
+              <a:rPr lang="en-US" dirty="0"/>
+              <a:t>. </a:t>
+            </a:r>
+            <a:r>
+              <a:rPr lang="bg-BG" dirty="0"/>
+              <a:t>На случаен принцип генерирайте 10 различни страни и съответно височини към тях и изведете лицето на образувания от тях триъгълник на </a:t>
+            </a:r>
+            <a:r>
+              <a:rPr lang="bg-BG" dirty="0" smtClean="0"/>
+              <a:t>екрана</a:t>
+            </a:r>
+            <a:endParaRPr lang="en-US" dirty="0" smtClean="0"/>
+          </a:p>
+          <a:p>
+            <a:pPr marL="0" indent="0">
+              <a:buNone/>
+            </a:pPr>
+            <a:r>
+              <a:rPr lang="bg-BG" dirty="0" smtClean="0"/>
+              <a:t>Дефинирайте функция за пресмятането на лицето</a:t>
+            </a:r>
+          </a:p>
+          <a:p>
+            <a:pPr marL="0" indent="0">
+              <a:buNone/>
+            </a:pPr>
+            <a:r>
+              <a:rPr lang="bg-BG" dirty="0" smtClean="0"/>
+              <a:t>Дефинирайте функция за извеждането на страната, височината и лицето</a:t>
+            </a:r>
+            <a:endParaRPr lang="en-US" dirty="0" smtClean="0"/>
+          </a:p>
+          <a:p>
+            <a:endParaRPr lang="bg-BG" dirty="0"/>
+          </a:p>
+        </p:txBody>
+      </p:sp>
+    </p:spTree>
+    <p:extLst>
+      <p:ext uri="{BB962C8B-B14F-4D97-AF65-F5344CB8AC3E}">
+        <p14:creationId xmlns:p14="http://schemas.microsoft.com/office/powerpoint/2010/main" val="1168828631"/>
+      </p:ext>
+    </p:extLst>
+  </p:cSld>
+  <p:clrMapOvr>
+    <a:masterClrMapping/>
+  </p:clrMapOvr>
+</p:sld>
+</file>
+
+<file path=ppt/slides/slide16.xml><?xml version="1.0" encoding="utf-8"?>
+<p:sld xmlns:a="http://schemas.openxmlformats.org/drawingml/2006/main" xmlns:r="http://schemas.openxmlformats.org/officeDocument/2006/relationships" xmlns:p="http://schemas.openxmlformats.org/presentationml/2006/main">
+  <p:cSld>
+    <p:spTree>
+      <p:nvGrpSpPr>
+        <p:cNvPr id="1" name=""/>
+        <p:cNvGrpSpPr/>
+        <p:nvPr/>
+      </p:nvGrpSpPr>
+      <p:grpSpPr>
+        <a:xfrm>
+          <a:off x="0" y="0"/>
+          <a:ext cx="0" cy="0"/>
+          <a:chOff x="0" y="0"/>
+          <a:chExt cx="0" cy="0"/>
+        </a:xfrm>
+      </p:grpSpPr>
+      <p:sp>
+        <p:nvSpPr>
+          <p:cNvPr id="2" name="Title 1"/>
+          <p:cNvSpPr>
+            <a:spLocks noGrp="1"/>
+          </p:cNvSpPr>
+          <p:nvPr>
+            <p:ph type="title"/>
+          </p:nvPr>
+        </p:nvSpPr>
+        <p:spPr/>
+        <p:txBody>
+          <a:bodyPr/>
+          <a:lstStyle/>
+          <a:p>
+            <a:pPr algn="ctr"/>
+            <a:r>
               <a:rPr lang="bg-BG" dirty="0" smtClean="0"/>
               <a:t>Живот на променливите в </a:t>
             </a:r>
@@ -13066,7 +13263,7 @@
 </p:sld>
 </file>
 
-<file path=ppt/slides/slide15.xml><?xml version="1.0" encoding="utf-8"?>
+<file path=ppt/slides/slide17.xml><?xml version="1.0" encoding="utf-8"?>
 <p:sld xmlns:a="http://schemas.openxmlformats.org/drawingml/2006/main" xmlns:r="http://schemas.openxmlformats.org/officeDocument/2006/relationships" xmlns:p="http://schemas.openxmlformats.org/presentationml/2006/main">
   <p:cSld>
     <p:spTree>
@@ -13172,7 +13369,7 @@
 </p:sld>
 </file>
 
-<file path=ppt/slides/slide16.xml><?xml version="1.0" encoding="utf-8"?>
+<file path=ppt/slides/slide18.xml><?xml version="1.0" encoding="utf-8"?>
 <p:sld xmlns:a="http://schemas.openxmlformats.org/drawingml/2006/main" xmlns:r="http://schemas.openxmlformats.org/officeDocument/2006/relationships" xmlns:p="http://schemas.openxmlformats.org/presentationml/2006/main">
   <p:cSld>
     <p:spTree>
@@ -13265,7 +13462,7 @@
 </p:sld>
 </file>
 
-<file path=ppt/slides/slide17.xml><?xml version="1.0" encoding="utf-8"?>
+<file path=ppt/slides/slide19.xml><?xml version="1.0" encoding="utf-8"?>
 <p:sld xmlns:a="http://schemas.openxmlformats.org/drawingml/2006/main" xmlns:r="http://schemas.openxmlformats.org/officeDocument/2006/relationships" xmlns:p="http://schemas.openxmlformats.org/presentationml/2006/main">
   <p:cSld>
     <p:spTree>
@@ -13368,7 +13565,7 @@
 </p:sld>
 </file>
 
-<file path=ppt/slides/slide18.xml><?xml version="1.0" encoding="utf-8"?>
+<file path=ppt/slides/slide2.xml><?xml version="1.0" encoding="utf-8"?>
 <p:sld xmlns:a="http://schemas.openxmlformats.org/drawingml/2006/main" xmlns:r="http://schemas.openxmlformats.org/officeDocument/2006/relationships" xmlns:p="http://schemas.openxmlformats.org/presentationml/2006/main">
   <p:cSld>
     <p:spTree>
@@ -13400,10 +13597,13 @@
           <a:bodyPr/>
           <a:lstStyle/>
           <a:p>
-            <a:pPr algn="ctr"/>
             <a:r>
               <a:rPr lang="bg-BG" dirty="0" smtClean="0"/>
-              <a:t>Задача</a:t>
+              <a:t>Генериране на случайни стойности в </a:t>
+            </a:r>
+            <a:r>
+              <a:rPr lang="en-US" dirty="0" smtClean="0"/>
+              <a:t>JAVA</a:t>
             </a:r>
             <a:endParaRPr lang="en-US" dirty="0"/>
           </a:p>
@@ -13425,6 +13625,107 @@
           <a:lstStyle/>
           <a:p>
             <a:r>
+              <a:rPr lang="bg-BG" dirty="0" smtClean="0"/>
+              <a:t>В сферата на софтуерното инженерство съществува проблем с генериране на случайни стойности</a:t>
+            </a:r>
+          </a:p>
+          <a:p>
+            <a:r>
+              <a:rPr lang="bg-BG" dirty="0" smtClean="0"/>
+              <a:t>Генерираните от </a:t>
+            </a:r>
+            <a:r>
+              <a:rPr lang="en-US" dirty="0" smtClean="0"/>
+              <a:t>JAVA </a:t>
+            </a:r>
+            <a:r>
+              <a:rPr lang="bg-BG" dirty="0" smtClean="0"/>
+              <a:t>стойности се наричат „псевдо случайни“</a:t>
+            </a:r>
+          </a:p>
+          <a:p>
+            <a:r>
+              <a:rPr lang="bg-BG" dirty="0" smtClean="0"/>
+              <a:t>Псевдо случайните стойности се генерират с помощта на обекта </a:t>
+            </a:r>
+            <a:r>
+              <a:rPr lang="en-US" dirty="0" smtClean="0"/>
+              <a:t>Rand</a:t>
+            </a:r>
+            <a:endParaRPr lang="en-US" dirty="0"/>
+          </a:p>
+        </p:txBody>
+      </p:sp>
+    </p:spTree>
+    <p:extLst>
+      <p:ext uri="{BB962C8B-B14F-4D97-AF65-F5344CB8AC3E}">
+        <p14:creationId xmlns:p14="http://schemas.microsoft.com/office/powerpoint/2010/main" val="1722930408"/>
+      </p:ext>
+    </p:extLst>
+  </p:cSld>
+  <p:clrMapOvr>
+    <a:masterClrMapping/>
+  </p:clrMapOvr>
+</p:sld>
+</file>
+
+<file path=ppt/slides/slide20.xml><?xml version="1.0" encoding="utf-8"?>
+<p:sld xmlns:a="http://schemas.openxmlformats.org/drawingml/2006/main" xmlns:r="http://schemas.openxmlformats.org/officeDocument/2006/relationships" xmlns:p="http://schemas.openxmlformats.org/presentationml/2006/main">
+  <p:cSld>
+    <p:spTree>
+      <p:nvGrpSpPr>
+        <p:cNvPr id="1" name=""/>
+        <p:cNvGrpSpPr/>
+        <p:nvPr/>
+      </p:nvGrpSpPr>
+      <p:grpSpPr>
+        <a:xfrm>
+          <a:off x="0" y="0"/>
+          <a:ext cx="0" cy="0"/>
+          <a:chOff x="0" y="0"/>
+          <a:chExt cx="0" cy="0"/>
+        </a:xfrm>
+      </p:grpSpPr>
+      <p:sp>
+        <p:nvSpPr>
+          <p:cNvPr id="2" name="Title 1"/>
+          <p:cNvSpPr>
+            <a:spLocks noGrp="1"/>
+          </p:cNvSpPr>
+          <p:nvPr>
+            <p:ph type="title"/>
+          </p:nvPr>
+        </p:nvSpPr>
+        <p:spPr/>
+        <p:txBody>
+          <a:bodyPr/>
+          <a:lstStyle/>
+          <a:p>
+            <a:pPr algn="ctr"/>
+            <a:r>
+              <a:rPr lang="bg-BG" dirty="0" smtClean="0"/>
+              <a:t>Задача</a:t>
+            </a:r>
+            <a:endParaRPr lang="en-US" dirty="0"/>
+          </a:p>
+        </p:txBody>
+      </p:sp>
+      <p:sp>
+        <p:nvSpPr>
+          <p:cNvPr id="3" name="Content Placeholder 2"/>
+          <p:cNvSpPr>
+            <a:spLocks noGrp="1"/>
+          </p:cNvSpPr>
+          <p:nvPr>
+            <p:ph idx="1"/>
+          </p:nvPr>
+        </p:nvSpPr>
+        <p:spPr/>
+        <p:txBody>
+          <a:bodyPr/>
+          <a:lstStyle/>
+          <a:p>
+            <a:r>
               <a:rPr lang="ru-RU" dirty="0"/>
               <a:t>Да се състави програма на </a:t>
             </a:r>
@@ -13459,10 +13760,6 @@
             <a:r>
               <a:rPr lang="ru-RU" dirty="0"/>
               <a:t> </a:t>
-            </a:r>
-            <a:r>
-              <a:rPr lang="ru-RU" dirty="0"/>
-              <a:t/>
             </a:r>
             <a:br>
               <a:rPr lang="ru-RU" dirty="0"/>
@@ -13502,7 +13799,7 @@
 </p:sld>
 </file>
 
-<file path=ppt/slides/slide19.xml><?xml version="1.0" encoding="utf-8"?>
+<file path=ppt/slides/slide21.xml><?xml version="1.0" encoding="utf-8"?>
 <p:sld xmlns:a="http://schemas.openxmlformats.org/drawingml/2006/main" xmlns:r="http://schemas.openxmlformats.org/officeDocument/2006/relationships" xmlns:p="http://schemas.openxmlformats.org/presentationml/2006/main">
   <p:cSld>
     <p:spTree>
@@ -13588,110 +13885,6 @@
     <p:extLst>
       <p:ext uri="{BB962C8B-B14F-4D97-AF65-F5344CB8AC3E}">
         <p14:creationId xmlns:p14="http://schemas.microsoft.com/office/powerpoint/2010/main" val="1879393112"/>
-      </p:ext>
-    </p:extLst>
-  </p:cSld>
-  <p:clrMapOvr>
-    <a:masterClrMapping/>
-  </p:clrMapOvr>
-</p:sld>
-</file>
-
-<file path=ppt/slides/slide2.xml><?xml version="1.0" encoding="utf-8"?>
-<p:sld xmlns:a="http://schemas.openxmlformats.org/drawingml/2006/main" xmlns:r="http://schemas.openxmlformats.org/officeDocument/2006/relationships" xmlns:p="http://schemas.openxmlformats.org/presentationml/2006/main">
-  <p:cSld>
-    <p:spTree>
-      <p:nvGrpSpPr>
-        <p:cNvPr id="1" name=""/>
-        <p:cNvGrpSpPr/>
-        <p:nvPr/>
-      </p:nvGrpSpPr>
-      <p:grpSpPr>
-        <a:xfrm>
-          <a:off x="0" y="0"/>
-          <a:ext cx="0" cy="0"/>
-          <a:chOff x="0" y="0"/>
-          <a:chExt cx="0" cy="0"/>
-        </a:xfrm>
-      </p:grpSpPr>
-      <p:sp>
-        <p:nvSpPr>
-          <p:cNvPr id="2" name="Title 1"/>
-          <p:cNvSpPr>
-            <a:spLocks noGrp="1"/>
-          </p:cNvSpPr>
-          <p:nvPr>
-            <p:ph type="title"/>
-          </p:nvPr>
-        </p:nvSpPr>
-        <p:spPr/>
-        <p:txBody>
-          <a:bodyPr/>
-          <a:lstStyle/>
-          <a:p>
-            <a:r>
-              <a:rPr lang="bg-BG" dirty="0" smtClean="0"/>
-              <a:t>Генериране на случайни стойности в </a:t>
-            </a:r>
-            <a:r>
-              <a:rPr lang="en-US" dirty="0" smtClean="0"/>
-              <a:t>JAVA</a:t>
-            </a:r>
-            <a:endParaRPr lang="en-US" dirty="0"/>
-          </a:p>
-        </p:txBody>
-      </p:sp>
-      <p:sp>
-        <p:nvSpPr>
-          <p:cNvPr id="3" name="Content Placeholder 2"/>
-          <p:cNvSpPr>
-            <a:spLocks noGrp="1"/>
-          </p:cNvSpPr>
-          <p:nvPr>
-            <p:ph idx="1"/>
-          </p:nvPr>
-        </p:nvSpPr>
-        <p:spPr/>
-        <p:txBody>
-          <a:bodyPr/>
-          <a:lstStyle/>
-          <a:p>
-            <a:r>
-              <a:rPr lang="bg-BG" dirty="0" smtClean="0"/>
-              <a:t>В сферата на софтуерното инженерство съществува проблем с генериране на случайни стойности</a:t>
-            </a:r>
-          </a:p>
-          <a:p>
-            <a:r>
-              <a:rPr lang="bg-BG" dirty="0" smtClean="0"/>
-              <a:t>Генерираните от </a:t>
-            </a:r>
-            <a:r>
-              <a:rPr lang="en-US" dirty="0" smtClean="0"/>
-              <a:t>JAVA </a:t>
-            </a:r>
-            <a:r>
-              <a:rPr lang="bg-BG" dirty="0" smtClean="0"/>
-              <a:t>стойности се наричат „псевдо случайни“</a:t>
-            </a:r>
-          </a:p>
-          <a:p>
-            <a:r>
-              <a:rPr lang="bg-BG" dirty="0" smtClean="0"/>
-              <a:t>Псевдо случайните стойности се генерират с помощта на обекта </a:t>
-            </a:r>
-            <a:r>
-              <a:rPr lang="en-US" dirty="0" smtClean="0"/>
-              <a:t>Rand</a:t>
-            </a:r>
-            <a:endParaRPr lang="en-US" dirty="0"/>
-          </a:p>
-        </p:txBody>
-      </p:sp>
-    </p:spTree>
-    <p:extLst>
-      <p:ext uri="{BB962C8B-B14F-4D97-AF65-F5344CB8AC3E}">
-        <p14:creationId xmlns:p14="http://schemas.microsoft.com/office/powerpoint/2010/main" val="1722930408"/>
       </p:ext>
     </p:extLst>
   </p:cSld>

</xml_diff>

<commit_message>
Fixed Typos in Functions Lection
</commit_message>
<xml_diff>
--- a/04.functions.pptx
+++ b/04.functions.pptx
@@ -182,7 +182,7 @@
           <a:noFill/>
           <a:extLst>
             <a:ext uri="{909E8E84-426E-40dd-AFC4-6F175D3DCCD1}">
-              <a14:hiddenFill xmlns="" xmlns:a14="http://schemas.microsoft.com/office/drawing/2010/main">
+              <a14:hiddenFill xmlns:a14="http://schemas.microsoft.com/office/drawing/2010/main" xmlns="">
                 <a:solidFill>
                   <a:srgbClr val="FFFFFF"/>
                 </a:solidFill>
@@ -242,7 +242,7 @@
             </a:ln>
             <a:extLst>
               <a:ext uri="{91240B29-F687-4f45-9708-019B960494DF}">
-                <a14:hiddenLine xmlns="" xmlns:a14="http://schemas.microsoft.com/office/drawing/2010/main" w="9525">
+                <a14:hiddenLine xmlns:a14="http://schemas.microsoft.com/office/drawing/2010/main" xmlns="" w="9525">
                   <a:solidFill>
                     <a:srgbClr val="000000"/>
                   </a:solidFill>
@@ -332,7 +332,7 @@
             </a:ln>
             <a:extLst>
               <a:ext uri="{91240B29-F687-4f45-9708-019B960494DF}">
-                <a14:hiddenLine xmlns="" xmlns:a14="http://schemas.microsoft.com/office/drawing/2010/main" w="9525">
+                <a14:hiddenLine xmlns:a14="http://schemas.microsoft.com/office/drawing/2010/main" xmlns="" w="9525">
                   <a:solidFill>
                     <a:srgbClr val="000000"/>
                   </a:solidFill>
@@ -422,7 +422,7 @@
             </a:ln>
             <a:extLst>
               <a:ext uri="{91240B29-F687-4f45-9708-019B960494DF}">
-                <a14:hiddenLine xmlns="" xmlns:a14="http://schemas.microsoft.com/office/drawing/2010/main" w="9525">
+                <a14:hiddenLine xmlns:a14="http://schemas.microsoft.com/office/drawing/2010/main" xmlns="" w="9525">
                   <a:solidFill>
                     <a:srgbClr val="000000"/>
                   </a:solidFill>
@@ -456,7 +456,7 @@
             </a:ln>
             <a:extLst>
               <a:ext uri="{91240B29-F687-4f45-9708-019B960494DF}">
-                <a14:hiddenLine xmlns="" xmlns:a14="http://schemas.microsoft.com/office/drawing/2010/main" w="9525">
+                <a14:hiddenLine xmlns:a14="http://schemas.microsoft.com/office/drawing/2010/main" xmlns="" w="9525">
                   <a:solidFill>
                     <a:srgbClr val="000000"/>
                   </a:solidFill>
@@ -546,7 +546,7 @@
             </a:ln>
             <a:extLst>
               <a:ext uri="{91240B29-F687-4f45-9708-019B960494DF}">
-                <a14:hiddenLine xmlns="" xmlns:a14="http://schemas.microsoft.com/office/drawing/2010/main" w="9525">
+                <a14:hiddenLine xmlns:a14="http://schemas.microsoft.com/office/drawing/2010/main" xmlns="" w="9525">
                   <a:solidFill>
                     <a:srgbClr val="000000"/>
                   </a:solidFill>
@@ -608,7 +608,7 @@
             </a:ln>
             <a:extLst>
               <a:ext uri="{91240B29-F687-4f45-9708-019B960494DF}">
-                <a14:hiddenLine xmlns="" xmlns:a14="http://schemas.microsoft.com/office/drawing/2010/main" w="9525">
+                <a14:hiddenLine xmlns:a14="http://schemas.microsoft.com/office/drawing/2010/main" xmlns="" w="9525">
                   <a:solidFill>
                     <a:srgbClr val="000000"/>
                   </a:solidFill>
@@ -670,7 +670,7 @@
             </a:ln>
             <a:extLst>
               <a:ext uri="{91240B29-F687-4f45-9708-019B960494DF}">
-                <a14:hiddenLine xmlns="" xmlns:a14="http://schemas.microsoft.com/office/drawing/2010/main" w="9525">
+                <a14:hiddenLine xmlns:a14="http://schemas.microsoft.com/office/drawing/2010/main" xmlns="" w="9525">
                   <a:solidFill>
                     <a:srgbClr val="000000"/>
                   </a:solidFill>
@@ -760,7 +760,7 @@
             </a:ln>
             <a:extLst>
               <a:ext uri="{91240B29-F687-4f45-9708-019B960494DF}">
-                <a14:hiddenLine xmlns="" xmlns:a14="http://schemas.microsoft.com/office/drawing/2010/main" w="9525">
+                <a14:hiddenLine xmlns:a14="http://schemas.microsoft.com/office/drawing/2010/main" xmlns="" w="9525">
                   <a:solidFill>
                     <a:srgbClr val="000000"/>
                   </a:solidFill>
@@ -822,7 +822,7 @@
             </a:ln>
             <a:extLst>
               <a:ext uri="{91240B29-F687-4f45-9708-019B960494DF}">
-                <a14:hiddenLine xmlns="" xmlns:a14="http://schemas.microsoft.com/office/drawing/2010/main" w="9525">
+                <a14:hiddenLine xmlns:a14="http://schemas.microsoft.com/office/drawing/2010/main" xmlns="" w="9525">
                   <a:solidFill>
                     <a:srgbClr val="000000"/>
                   </a:solidFill>
@@ -884,7 +884,7 @@
             </a:ln>
             <a:extLst>
               <a:ext uri="{91240B29-F687-4f45-9708-019B960494DF}">
-                <a14:hiddenLine xmlns="" xmlns:a14="http://schemas.microsoft.com/office/drawing/2010/main" w="9525">
+                <a14:hiddenLine xmlns:a14="http://schemas.microsoft.com/office/drawing/2010/main" xmlns="" w="9525">
                   <a:solidFill>
                     <a:srgbClr val="000000"/>
                   </a:solidFill>
@@ -974,7 +974,7 @@
             </a:ln>
             <a:extLst>
               <a:ext uri="{91240B29-F687-4f45-9708-019B960494DF}">
-                <a14:hiddenLine xmlns="" xmlns:a14="http://schemas.microsoft.com/office/drawing/2010/main" w="9525">
+                <a14:hiddenLine xmlns:a14="http://schemas.microsoft.com/office/drawing/2010/main" xmlns="" w="9525">
                   <a:solidFill>
                     <a:srgbClr val="000000"/>
                   </a:solidFill>
@@ -1064,7 +1064,7 @@
             </a:ln>
             <a:extLst>
               <a:ext uri="{91240B29-F687-4f45-9708-019B960494DF}">
-                <a14:hiddenLine xmlns="" xmlns:a14="http://schemas.microsoft.com/office/drawing/2010/main" w="9525">
+                <a14:hiddenLine xmlns:a14="http://schemas.microsoft.com/office/drawing/2010/main" xmlns="" w="9525">
                   <a:solidFill>
                     <a:srgbClr val="000000"/>
                   </a:solidFill>
@@ -1126,7 +1126,7 @@
             </a:ln>
             <a:extLst>
               <a:ext uri="{91240B29-F687-4f45-9708-019B960494DF}">
-                <a14:hiddenLine xmlns="" xmlns:a14="http://schemas.microsoft.com/office/drawing/2010/main" w="9525">
+                <a14:hiddenLine xmlns:a14="http://schemas.microsoft.com/office/drawing/2010/main" xmlns="" w="9525">
                   <a:solidFill>
                     <a:srgbClr val="000000"/>
                   </a:solidFill>
@@ -1236,7 +1236,7 @@
             </a:ln>
             <a:extLst>
               <a:ext uri="{91240B29-F687-4f45-9708-019B960494DF}">
-                <a14:hiddenLine xmlns="" xmlns:a14="http://schemas.microsoft.com/office/drawing/2010/main" w="9525">
+                <a14:hiddenLine xmlns:a14="http://schemas.microsoft.com/office/drawing/2010/main" xmlns="" w="9525">
                   <a:solidFill>
                     <a:srgbClr val="000000"/>
                   </a:solidFill>
@@ -1298,7 +1298,7 @@
             </a:ln>
             <a:extLst>
               <a:ext uri="{91240B29-F687-4f45-9708-019B960494DF}">
-                <a14:hiddenLine xmlns="" xmlns:a14="http://schemas.microsoft.com/office/drawing/2010/main" w="9525">
+                <a14:hiddenLine xmlns:a14="http://schemas.microsoft.com/office/drawing/2010/main" xmlns="" w="9525">
                   <a:solidFill>
                     <a:srgbClr val="000000"/>
                   </a:solidFill>
@@ -1388,7 +1388,7 @@
             </a:ln>
             <a:extLst>
               <a:ext uri="{91240B29-F687-4f45-9708-019B960494DF}">
-                <a14:hiddenLine xmlns="" xmlns:a14="http://schemas.microsoft.com/office/drawing/2010/main" w="9525">
+                <a14:hiddenLine xmlns:a14="http://schemas.microsoft.com/office/drawing/2010/main" xmlns="" w="9525">
                   <a:solidFill>
                     <a:srgbClr val="000000"/>
                   </a:solidFill>
@@ -1478,7 +1478,7 @@
             </a:ln>
             <a:extLst>
               <a:ext uri="{91240B29-F687-4f45-9708-019B960494DF}">
-                <a14:hiddenLine xmlns="" xmlns:a14="http://schemas.microsoft.com/office/drawing/2010/main" w="9525">
+                <a14:hiddenLine xmlns:a14="http://schemas.microsoft.com/office/drawing/2010/main" xmlns="" w="9525">
                   <a:solidFill>
                     <a:srgbClr val="000000"/>
                   </a:solidFill>
@@ -1540,7 +1540,7 @@
             </a:ln>
             <a:extLst>
               <a:ext uri="{91240B29-F687-4f45-9708-019B960494DF}">
-                <a14:hiddenLine xmlns="" xmlns:a14="http://schemas.microsoft.com/office/drawing/2010/main" w="9525">
+                <a14:hiddenLine xmlns:a14="http://schemas.microsoft.com/office/drawing/2010/main" xmlns="" w="9525">
                   <a:solidFill>
                     <a:srgbClr val="000000"/>
                   </a:solidFill>
@@ -1630,7 +1630,7 @@
             </a:ln>
             <a:extLst>
               <a:ext uri="{91240B29-F687-4f45-9708-019B960494DF}">
-                <a14:hiddenLine xmlns="" xmlns:a14="http://schemas.microsoft.com/office/drawing/2010/main" w="9525">
+                <a14:hiddenLine xmlns:a14="http://schemas.microsoft.com/office/drawing/2010/main" xmlns="" w="9525">
                   <a:solidFill>
                     <a:srgbClr val="000000"/>
                   </a:solidFill>
@@ -1720,7 +1720,7 @@
             </a:ln>
             <a:extLst>
               <a:ext uri="{91240B29-F687-4f45-9708-019B960494DF}">
-                <a14:hiddenLine xmlns="" xmlns:a14="http://schemas.microsoft.com/office/drawing/2010/main" w="9525">
+                <a14:hiddenLine xmlns:a14="http://schemas.microsoft.com/office/drawing/2010/main" xmlns="" w="9525">
                   <a:solidFill>
                     <a:srgbClr val="000000"/>
                   </a:solidFill>
@@ -1776,7 +1776,7 @@
             </a:ln>
             <a:extLst>
               <a:ext uri="{91240B29-F687-4f45-9708-019B960494DF}">
-                <a14:hiddenLine xmlns="" xmlns:a14="http://schemas.microsoft.com/office/drawing/2010/main" w="9525">
+                <a14:hiddenLine xmlns:a14="http://schemas.microsoft.com/office/drawing/2010/main" xmlns="" w="9525">
                   <a:solidFill>
                     <a:srgbClr val="000000"/>
                   </a:solidFill>
@@ -1866,7 +1866,7 @@
             </a:ln>
             <a:extLst>
               <a:ext uri="{91240B29-F687-4f45-9708-019B960494DF}">
-                <a14:hiddenLine xmlns="" xmlns:a14="http://schemas.microsoft.com/office/drawing/2010/main" w="9525">
+                <a14:hiddenLine xmlns:a14="http://schemas.microsoft.com/office/drawing/2010/main" xmlns="" w="9525">
                   <a:solidFill>
                     <a:srgbClr val="000000"/>
                   </a:solidFill>
@@ -1922,7 +1922,7 @@
             </a:ln>
             <a:extLst>
               <a:ext uri="{91240B29-F687-4f45-9708-019B960494DF}">
-                <a14:hiddenLine xmlns="" xmlns:a14="http://schemas.microsoft.com/office/drawing/2010/main" w="9525">
+                <a14:hiddenLine xmlns:a14="http://schemas.microsoft.com/office/drawing/2010/main" xmlns="" w="9525">
                   <a:solidFill>
                     <a:srgbClr val="000000"/>
                   </a:solidFill>
@@ -2012,7 +2012,7 @@
             </a:ln>
             <a:extLst>
               <a:ext uri="{91240B29-F687-4f45-9708-019B960494DF}">
-                <a14:hiddenLine xmlns="" xmlns:a14="http://schemas.microsoft.com/office/drawing/2010/main" w="9525">
+                <a14:hiddenLine xmlns:a14="http://schemas.microsoft.com/office/drawing/2010/main" xmlns="" w="9525">
                   <a:solidFill>
                     <a:srgbClr val="000000"/>
                   </a:solidFill>
@@ -2080,7 +2080,7 @@
             </a:ln>
             <a:extLst>
               <a:ext uri="{91240B29-F687-4f45-9708-019B960494DF}">
-                <a14:hiddenLine xmlns="" xmlns:a14="http://schemas.microsoft.com/office/drawing/2010/main" w="9525">
+                <a14:hiddenLine xmlns:a14="http://schemas.microsoft.com/office/drawing/2010/main" xmlns="" w="9525">
                   <a:solidFill>
                     <a:srgbClr val="000000"/>
                   </a:solidFill>
@@ -2170,7 +2170,7 @@
             </a:ln>
             <a:extLst>
               <a:ext uri="{91240B29-F687-4f45-9708-019B960494DF}">
-                <a14:hiddenLine xmlns="" xmlns:a14="http://schemas.microsoft.com/office/drawing/2010/main" w="9525">
+                <a14:hiddenLine xmlns:a14="http://schemas.microsoft.com/office/drawing/2010/main" xmlns="" w="9525">
                   <a:solidFill>
                     <a:srgbClr val="000000"/>
                   </a:solidFill>
@@ -2238,7 +2238,7 @@
             </a:ln>
             <a:extLst>
               <a:ext uri="{91240B29-F687-4f45-9708-019B960494DF}">
-                <a14:hiddenLine xmlns="" xmlns:a14="http://schemas.microsoft.com/office/drawing/2010/main" w="9525">
+                <a14:hiddenLine xmlns:a14="http://schemas.microsoft.com/office/drawing/2010/main" xmlns="" w="9525">
                   <a:solidFill>
                     <a:srgbClr val="000000"/>
                   </a:solidFill>
@@ -2328,7 +2328,7 @@
             </a:ln>
             <a:extLst>
               <a:ext uri="{91240B29-F687-4f45-9708-019B960494DF}">
-                <a14:hiddenLine xmlns="" xmlns:a14="http://schemas.microsoft.com/office/drawing/2010/main" w="9525">
+                <a14:hiddenLine xmlns:a14="http://schemas.microsoft.com/office/drawing/2010/main" xmlns="" w="9525">
                   <a:solidFill>
                     <a:srgbClr val="000000"/>
                   </a:solidFill>
@@ -2362,7 +2362,7 @@
             </a:ln>
             <a:extLst>
               <a:ext uri="{91240B29-F687-4f45-9708-019B960494DF}">
-                <a14:hiddenLine xmlns="" xmlns:a14="http://schemas.microsoft.com/office/drawing/2010/main" w="9525">
+                <a14:hiddenLine xmlns:a14="http://schemas.microsoft.com/office/drawing/2010/main" xmlns="" w="9525">
                   <a:solidFill>
                     <a:srgbClr val="000000"/>
                   </a:solidFill>
@@ -2452,7 +2452,7 @@
             </a:ln>
             <a:extLst>
               <a:ext uri="{91240B29-F687-4f45-9708-019B960494DF}">
-                <a14:hiddenLine xmlns="" xmlns:a14="http://schemas.microsoft.com/office/drawing/2010/main" w="9525">
+                <a14:hiddenLine xmlns:a14="http://schemas.microsoft.com/office/drawing/2010/main" xmlns="" w="9525">
                   <a:solidFill>
                     <a:srgbClr val="000000"/>
                   </a:solidFill>
@@ -2514,7 +2514,7 @@
             </a:ln>
             <a:extLst>
               <a:ext uri="{91240B29-F687-4f45-9708-019B960494DF}">
-                <a14:hiddenLine xmlns="" xmlns:a14="http://schemas.microsoft.com/office/drawing/2010/main" w="9525">
+                <a14:hiddenLine xmlns:a14="http://schemas.microsoft.com/office/drawing/2010/main" xmlns="" w="9525">
                   <a:solidFill>
                     <a:srgbClr val="000000"/>
                   </a:solidFill>
@@ -2576,7 +2576,7 @@
             </a:ln>
             <a:extLst>
               <a:ext uri="{91240B29-F687-4f45-9708-019B960494DF}">
-                <a14:hiddenLine xmlns="" xmlns:a14="http://schemas.microsoft.com/office/drawing/2010/main" w="9525">
+                <a14:hiddenLine xmlns:a14="http://schemas.microsoft.com/office/drawing/2010/main" xmlns="" w="9525">
                   <a:solidFill>
                     <a:srgbClr val="000000"/>
                   </a:solidFill>
@@ -2666,7 +2666,7 @@
             </a:ln>
             <a:extLst>
               <a:ext uri="{91240B29-F687-4f45-9708-019B960494DF}">
-                <a14:hiddenLine xmlns="" xmlns:a14="http://schemas.microsoft.com/office/drawing/2010/main" w="9525">
+                <a14:hiddenLine xmlns:a14="http://schemas.microsoft.com/office/drawing/2010/main" xmlns="" w="9525">
                   <a:solidFill>
                     <a:srgbClr val="000000"/>
                   </a:solidFill>
@@ -2734,7 +2734,7 @@
             </a:ln>
             <a:extLst>
               <a:ext uri="{91240B29-F687-4f45-9708-019B960494DF}">
-                <a14:hiddenLine xmlns="" xmlns:a14="http://schemas.microsoft.com/office/drawing/2010/main" w="9525">
+                <a14:hiddenLine xmlns:a14="http://schemas.microsoft.com/office/drawing/2010/main" xmlns="" w="9525">
                   <a:solidFill>
                     <a:srgbClr val="000000"/>
                   </a:solidFill>
@@ -2796,7 +2796,7 @@
             </a:ln>
             <a:extLst>
               <a:ext uri="{91240B29-F687-4f45-9708-019B960494DF}">
-                <a14:hiddenLine xmlns="" xmlns:a14="http://schemas.microsoft.com/office/drawing/2010/main" w="9525">
+                <a14:hiddenLine xmlns:a14="http://schemas.microsoft.com/office/drawing/2010/main" xmlns="" w="9525">
                   <a:solidFill>
                     <a:srgbClr val="000000"/>
                   </a:solidFill>
@@ -2886,7 +2886,7 @@
             </a:ln>
             <a:extLst>
               <a:ext uri="{91240B29-F687-4f45-9708-019B960494DF}">
-                <a14:hiddenLine xmlns="" xmlns:a14="http://schemas.microsoft.com/office/drawing/2010/main" w="9525">
+                <a14:hiddenLine xmlns:a14="http://schemas.microsoft.com/office/drawing/2010/main" xmlns="" w="9525">
                   <a:solidFill>
                     <a:srgbClr val="000000"/>
                   </a:solidFill>
@@ -2948,7 +2948,7 @@
             </a:ln>
             <a:extLst>
               <a:ext uri="{91240B29-F687-4f45-9708-019B960494DF}">
-                <a14:hiddenLine xmlns="" xmlns:a14="http://schemas.microsoft.com/office/drawing/2010/main" w="9525">
+                <a14:hiddenLine xmlns:a14="http://schemas.microsoft.com/office/drawing/2010/main" xmlns="" w="9525">
                   <a:solidFill>
                     <a:srgbClr val="000000"/>
                   </a:solidFill>
@@ -3038,7 +3038,7 @@
             </a:ln>
             <a:extLst>
               <a:ext uri="{91240B29-F687-4f45-9708-019B960494DF}">
-                <a14:hiddenLine xmlns="" xmlns:a14="http://schemas.microsoft.com/office/drawing/2010/main" w="9525">
+                <a14:hiddenLine xmlns:a14="http://schemas.microsoft.com/office/drawing/2010/main" xmlns="" w="9525">
                   <a:solidFill>
                     <a:srgbClr val="000000"/>
                   </a:solidFill>
@@ -3100,7 +3100,7 @@
             </a:ln>
             <a:extLst>
               <a:ext uri="{91240B29-F687-4f45-9708-019B960494DF}">
-                <a14:hiddenLine xmlns="" xmlns:a14="http://schemas.microsoft.com/office/drawing/2010/main" w="9525">
+                <a14:hiddenLine xmlns:a14="http://schemas.microsoft.com/office/drawing/2010/main" xmlns="" w="9525">
                   <a:solidFill>
                     <a:srgbClr val="000000"/>
                   </a:solidFill>
@@ -3190,7 +3190,7 @@
             </a:ln>
             <a:extLst>
               <a:ext uri="{91240B29-F687-4f45-9708-019B960494DF}">
-                <a14:hiddenLine xmlns="" xmlns:a14="http://schemas.microsoft.com/office/drawing/2010/main" w="9525">
+                <a14:hiddenLine xmlns:a14="http://schemas.microsoft.com/office/drawing/2010/main" xmlns="" w="9525">
                   <a:solidFill>
                     <a:srgbClr val="000000"/>
                   </a:solidFill>
@@ -3224,7 +3224,7 @@
             </a:ln>
             <a:extLst>
               <a:ext uri="{91240B29-F687-4f45-9708-019B960494DF}">
-                <a14:hiddenLine xmlns="" xmlns:a14="http://schemas.microsoft.com/office/drawing/2010/main" w="9525">
+                <a14:hiddenLine xmlns:a14="http://schemas.microsoft.com/office/drawing/2010/main" xmlns="" w="9525">
                   <a:solidFill>
                     <a:srgbClr val="000000"/>
                   </a:solidFill>
@@ -3289,7 +3289,7 @@
             </a:ln>
             <a:extLst>
               <a:ext uri="{91240B29-F687-4f45-9708-019B960494DF}">
-                <a14:hiddenLine xmlns="" xmlns:a14="http://schemas.microsoft.com/office/drawing/2010/main" w="9525">
+                <a14:hiddenLine xmlns:a14="http://schemas.microsoft.com/office/drawing/2010/main" xmlns="" w="9525">
                   <a:solidFill>
                     <a:srgbClr val="000000"/>
                   </a:solidFill>
@@ -3379,7 +3379,7 @@
             </a:ln>
             <a:extLst>
               <a:ext uri="{91240B29-F687-4f45-9708-019B960494DF}">
-                <a14:hiddenLine xmlns="" xmlns:a14="http://schemas.microsoft.com/office/drawing/2010/main" w="9525">
+                <a14:hiddenLine xmlns:a14="http://schemas.microsoft.com/office/drawing/2010/main" xmlns="" w="9525">
                   <a:solidFill>
                     <a:srgbClr val="000000"/>
                   </a:solidFill>
@@ -3441,7 +3441,7 @@
             </a:ln>
             <a:extLst>
               <a:ext uri="{91240B29-F687-4f45-9708-019B960494DF}">
-                <a14:hiddenLine xmlns="" xmlns:a14="http://schemas.microsoft.com/office/drawing/2010/main" w="9525">
+                <a14:hiddenLine xmlns:a14="http://schemas.microsoft.com/office/drawing/2010/main" xmlns="" w="9525">
                   <a:solidFill>
                     <a:srgbClr val="000000"/>
                   </a:solidFill>
@@ -3531,7 +3531,7 @@
             </a:ln>
             <a:extLst>
               <a:ext uri="{91240B29-F687-4f45-9708-019B960494DF}">
-                <a14:hiddenLine xmlns="" xmlns:a14="http://schemas.microsoft.com/office/drawing/2010/main" w="9525">
+                <a14:hiddenLine xmlns:a14="http://schemas.microsoft.com/office/drawing/2010/main" xmlns="" w="9525">
                   <a:solidFill>
                     <a:srgbClr val="000000"/>
                   </a:solidFill>
@@ -3621,7 +3621,7 @@
             </a:ln>
             <a:extLst>
               <a:ext uri="{91240B29-F687-4f45-9708-019B960494DF}">
-                <a14:hiddenLine xmlns="" xmlns:a14="http://schemas.microsoft.com/office/drawing/2010/main" w="9525">
+                <a14:hiddenLine xmlns:a14="http://schemas.microsoft.com/office/drawing/2010/main" xmlns="" w="9525">
                   <a:solidFill>
                     <a:srgbClr val="000000"/>
                   </a:solidFill>
@@ -3686,7 +3686,7 @@
             </a:ln>
             <a:extLst>
               <a:ext uri="{91240B29-F687-4f45-9708-019B960494DF}">
-                <a14:hiddenLine xmlns="" xmlns:a14="http://schemas.microsoft.com/office/drawing/2010/main" w="9525">
+                <a14:hiddenLine xmlns:a14="http://schemas.microsoft.com/office/drawing/2010/main" xmlns="" w="9525">
                   <a:solidFill>
                     <a:srgbClr val="000000"/>
                   </a:solidFill>
@@ -3748,7 +3748,7 @@
             </a:ln>
             <a:extLst>
               <a:ext uri="{91240B29-F687-4f45-9708-019B960494DF}">
-                <a14:hiddenLine xmlns="" xmlns:a14="http://schemas.microsoft.com/office/drawing/2010/main" w="9525">
+                <a14:hiddenLine xmlns:a14="http://schemas.microsoft.com/office/drawing/2010/main" xmlns="" w="9525">
                   <a:solidFill>
                     <a:srgbClr val="000000"/>
                   </a:solidFill>
@@ -3838,7 +3838,7 @@
             </a:ln>
             <a:extLst>
               <a:ext uri="{91240B29-F687-4f45-9708-019B960494DF}">
-                <a14:hiddenLine xmlns="" xmlns:a14="http://schemas.microsoft.com/office/drawing/2010/main" w="9525">
+                <a14:hiddenLine xmlns:a14="http://schemas.microsoft.com/office/drawing/2010/main" xmlns="" w="9525">
                   <a:solidFill>
                     <a:srgbClr val="000000"/>
                   </a:solidFill>
@@ -3928,7 +3928,7 @@
             </a:ln>
             <a:extLst>
               <a:ext uri="{91240B29-F687-4f45-9708-019B960494DF}">
-                <a14:hiddenLine xmlns="" xmlns:a14="http://schemas.microsoft.com/office/drawing/2010/main" w="9525">
+                <a14:hiddenLine xmlns:a14="http://schemas.microsoft.com/office/drawing/2010/main" xmlns="" w="9525">
                   <a:solidFill>
                     <a:srgbClr val="000000"/>
                   </a:solidFill>
@@ -3990,7 +3990,7 @@
             </a:ln>
             <a:extLst>
               <a:ext uri="{91240B29-F687-4f45-9708-019B960494DF}">
-                <a14:hiddenLine xmlns="" xmlns:a14="http://schemas.microsoft.com/office/drawing/2010/main" w="9525">
+                <a14:hiddenLine xmlns:a14="http://schemas.microsoft.com/office/drawing/2010/main" xmlns="" w="9525">
                   <a:solidFill>
                     <a:srgbClr val="000000"/>
                   </a:solidFill>
@@ -4110,7 +4110,7 @@
             </a:ln>
             <a:extLst>
               <a:ext uri="{91240B29-F687-4f45-9708-019B960494DF}">
-                <a14:hiddenLine xmlns="" xmlns:a14="http://schemas.microsoft.com/office/drawing/2010/main" w="9525">
+                <a14:hiddenLine xmlns:a14="http://schemas.microsoft.com/office/drawing/2010/main" xmlns="" w="9525">
                   <a:solidFill>
                     <a:srgbClr val="000000"/>
                   </a:solidFill>
@@ -4178,7 +4178,7 @@
             </a:ln>
             <a:extLst>
               <a:ext uri="{91240B29-F687-4f45-9708-019B960494DF}">
-                <a14:hiddenLine xmlns="" xmlns:a14="http://schemas.microsoft.com/office/drawing/2010/main" w="9525">
+                <a14:hiddenLine xmlns:a14="http://schemas.microsoft.com/office/drawing/2010/main" xmlns="" w="9525">
                   <a:solidFill>
                     <a:srgbClr val="000000"/>
                   </a:solidFill>
@@ -4268,7 +4268,7 @@
             </a:ln>
             <a:extLst>
               <a:ext uri="{91240B29-F687-4f45-9708-019B960494DF}">
-                <a14:hiddenLine xmlns="" xmlns:a14="http://schemas.microsoft.com/office/drawing/2010/main" w="9525">
+                <a14:hiddenLine xmlns:a14="http://schemas.microsoft.com/office/drawing/2010/main" xmlns="" w="9525">
                   <a:solidFill>
                     <a:srgbClr val="000000"/>
                   </a:solidFill>
@@ -4408,7 +4408,7 @@
           <a:p>
             <a:fld id="{841D4EFB-1649-4F74-89D1-9FCA056B78EF}" type="datetimeFigureOut">
               <a:rPr lang="en-US" smtClean="0"/>
-              <a:t>12/12/2014</a:t>
+              <a:t>12/13/2014</a:t>
             </a:fld>
             <a:endParaRPr lang="en-US"/>
           </a:p>
@@ -4675,7 +4675,7 @@
           <a:p>
             <a:fld id="{841D4EFB-1649-4F74-89D1-9FCA056B78EF}" type="datetimeFigureOut">
               <a:rPr lang="en-US" smtClean="0"/>
-              <a:t>12/12/2014</a:t>
+              <a:t>12/13/2014</a:t>
             </a:fld>
             <a:endParaRPr lang="en-US"/>
           </a:p>
@@ -4871,7 +4871,7 @@
           <a:p>
             <a:fld id="{841D4EFB-1649-4F74-89D1-9FCA056B78EF}" type="datetimeFigureOut">
               <a:rPr lang="en-US" smtClean="0"/>
-              <a:t>12/12/2014</a:t>
+              <a:t>12/13/2014</a:t>
             </a:fld>
             <a:endParaRPr lang="en-US"/>
           </a:p>
@@ -5134,7 +5134,7 @@
           <a:p>
             <a:fld id="{841D4EFB-1649-4F74-89D1-9FCA056B78EF}" type="datetimeFigureOut">
               <a:rPr lang="en-US" smtClean="0"/>
-              <a:t>12/12/2014</a:t>
+              <a:t>12/13/2014</a:t>
             </a:fld>
             <a:endParaRPr lang="en-US"/>
           </a:p>
@@ -5568,7 +5568,7 @@
           <a:p>
             <a:fld id="{841D4EFB-1649-4F74-89D1-9FCA056B78EF}" type="datetimeFigureOut">
               <a:rPr lang="en-US" smtClean="0"/>
-              <a:t>12/12/2014</a:t>
+              <a:t>12/13/2014</a:t>
             </a:fld>
             <a:endParaRPr lang="en-US"/>
           </a:p>
@@ -6114,7 +6114,7 @@
           <a:p>
             <a:fld id="{841D4EFB-1649-4F74-89D1-9FCA056B78EF}" type="datetimeFigureOut">
               <a:rPr lang="en-US" smtClean="0"/>
-              <a:t>12/12/2014</a:t>
+              <a:t>12/13/2014</a:t>
             </a:fld>
             <a:endParaRPr lang="en-US"/>
           </a:p>
@@ -6834,7 +6834,7 @@
           <a:p>
             <a:fld id="{841D4EFB-1649-4F74-89D1-9FCA056B78EF}" type="datetimeFigureOut">
               <a:rPr lang="en-US" smtClean="0"/>
-              <a:t>12/12/2014</a:t>
+              <a:t>12/13/2014</a:t>
             </a:fld>
             <a:endParaRPr lang="en-US"/>
           </a:p>
@@ -7004,7 +7004,7 @@
           <a:p>
             <a:fld id="{841D4EFB-1649-4F74-89D1-9FCA056B78EF}" type="datetimeFigureOut">
               <a:rPr lang="en-US" smtClean="0"/>
-              <a:t>12/12/2014</a:t>
+              <a:t>12/13/2014</a:t>
             </a:fld>
             <a:endParaRPr lang="en-US"/>
           </a:p>
@@ -7184,7 +7184,7 @@
           <a:p>
             <a:fld id="{841D4EFB-1649-4F74-89D1-9FCA056B78EF}" type="datetimeFigureOut">
               <a:rPr lang="en-US" smtClean="0"/>
-              <a:t>12/12/2014</a:t>
+              <a:t>12/13/2014</a:t>
             </a:fld>
             <a:endParaRPr lang="en-US"/>
           </a:p>
@@ -7354,7 +7354,7 @@
           <a:p>
             <a:fld id="{841D4EFB-1649-4F74-89D1-9FCA056B78EF}" type="datetimeFigureOut">
               <a:rPr lang="en-US" smtClean="0"/>
-              <a:t>12/12/2014</a:t>
+              <a:t>12/13/2014</a:t>
             </a:fld>
             <a:endParaRPr lang="en-US"/>
           </a:p>
@@ -7604,7 +7604,7 @@
           <a:p>
             <a:fld id="{841D4EFB-1649-4F74-89D1-9FCA056B78EF}" type="datetimeFigureOut">
               <a:rPr lang="en-US" smtClean="0"/>
-              <a:t>12/12/2014</a:t>
+              <a:t>12/13/2014</a:t>
             </a:fld>
             <a:endParaRPr lang="en-US"/>
           </a:p>
@@ -7836,7 +7836,7 @@
           <a:p>
             <a:fld id="{841D4EFB-1649-4F74-89D1-9FCA056B78EF}" type="datetimeFigureOut">
               <a:rPr lang="en-US" smtClean="0"/>
-              <a:t>12/12/2014</a:t>
+              <a:t>12/13/2014</a:t>
             </a:fld>
             <a:endParaRPr lang="en-US"/>
           </a:p>
@@ -8217,7 +8217,7 @@
           <a:p>
             <a:fld id="{841D4EFB-1649-4F74-89D1-9FCA056B78EF}" type="datetimeFigureOut">
               <a:rPr lang="en-US" smtClean="0"/>
-              <a:t>12/12/2014</a:t>
+              <a:t>12/13/2014</a:t>
             </a:fld>
             <a:endParaRPr lang="en-US"/>
           </a:p>
@@ -8335,7 +8335,7 @@
           <a:p>
             <a:fld id="{841D4EFB-1649-4F74-89D1-9FCA056B78EF}" type="datetimeFigureOut">
               <a:rPr lang="en-US" smtClean="0"/>
-              <a:t>12/12/2014</a:t>
+              <a:t>12/13/2014</a:t>
             </a:fld>
             <a:endParaRPr lang="en-US"/>
           </a:p>
@@ -8430,7 +8430,7 @@
           <a:p>
             <a:fld id="{841D4EFB-1649-4F74-89D1-9FCA056B78EF}" type="datetimeFigureOut">
               <a:rPr lang="en-US" smtClean="0"/>
-              <a:t>12/12/2014</a:t>
+              <a:t>12/13/2014</a:t>
             </a:fld>
             <a:endParaRPr lang="en-US"/>
           </a:p>
@@ -8679,7 +8679,7 @@
           <a:p>
             <a:fld id="{841D4EFB-1649-4F74-89D1-9FCA056B78EF}" type="datetimeFigureOut">
               <a:rPr lang="en-US" smtClean="0"/>
-              <a:t>12/12/2014</a:t>
+              <a:t>12/13/2014</a:t>
             </a:fld>
             <a:endParaRPr lang="en-US"/>
           </a:p>
@@ -8959,7 +8959,7 @@
           <a:p>
             <a:fld id="{841D4EFB-1649-4F74-89D1-9FCA056B78EF}" type="datetimeFigureOut">
               <a:rPr lang="en-US" smtClean="0"/>
-              <a:t>12/12/2014</a:t>
+              <a:t>12/13/2014</a:t>
             </a:fld>
             <a:endParaRPr lang="en-US"/>
           </a:p>
@@ -9075,7 +9075,7 @@
           <a:noFill/>
           <a:extLst>
             <a:ext uri="{909E8E84-426E-40dd-AFC4-6F175D3DCCD1}">
-              <a14:hiddenFill xmlns="" xmlns:a14="http://schemas.microsoft.com/office/drawing/2010/main">
+              <a14:hiddenFill xmlns:a14="http://schemas.microsoft.com/office/drawing/2010/main" xmlns="">
                 <a:solidFill>
                   <a:srgbClr val="FFFFFF"/>
                 </a:solidFill>
@@ -9149,7 +9149,7 @@
               </a:ln>
               <a:extLst>
                 <a:ext uri="{91240B29-F687-4f45-9708-019B960494DF}">
-                  <a14:hiddenLine xmlns="" xmlns:a14="http://schemas.microsoft.com/office/drawing/2010/main" w="9525">
+                  <a14:hiddenLine xmlns:a14="http://schemas.microsoft.com/office/drawing/2010/main" xmlns="" w="9525">
                     <a:solidFill>
                       <a:srgbClr val="000000"/>
                     </a:solidFill>
@@ -9239,7 +9239,7 @@
               </a:ln>
               <a:extLst>
                 <a:ext uri="{91240B29-F687-4f45-9708-019B960494DF}">
-                  <a14:hiddenLine xmlns="" xmlns:a14="http://schemas.microsoft.com/office/drawing/2010/main" w="9525">
+                  <a14:hiddenLine xmlns:a14="http://schemas.microsoft.com/office/drawing/2010/main" xmlns="" w="9525">
                     <a:solidFill>
                       <a:srgbClr val="000000"/>
                     </a:solidFill>
@@ -9329,7 +9329,7 @@
               </a:ln>
               <a:extLst>
                 <a:ext uri="{91240B29-F687-4f45-9708-019B960494DF}">
-                  <a14:hiddenLine xmlns="" xmlns:a14="http://schemas.microsoft.com/office/drawing/2010/main" w="9525">
+                  <a14:hiddenLine xmlns:a14="http://schemas.microsoft.com/office/drawing/2010/main" xmlns="" w="9525">
                     <a:solidFill>
                       <a:srgbClr val="000000"/>
                     </a:solidFill>
@@ -9391,7 +9391,7 @@
               </a:ln>
               <a:extLst>
                 <a:ext uri="{91240B29-F687-4f45-9708-019B960494DF}">
-                  <a14:hiddenLine xmlns="" xmlns:a14="http://schemas.microsoft.com/office/drawing/2010/main" w="9525">
+                  <a14:hiddenLine xmlns:a14="http://schemas.microsoft.com/office/drawing/2010/main" xmlns="" w="9525">
                     <a:solidFill>
                       <a:srgbClr val="000000"/>
                     </a:solidFill>
@@ -9481,7 +9481,7 @@
               </a:ln>
               <a:extLst>
                 <a:ext uri="{91240B29-F687-4f45-9708-019B960494DF}">
-                  <a14:hiddenLine xmlns="" xmlns:a14="http://schemas.microsoft.com/office/drawing/2010/main" w="9525">
+                  <a14:hiddenLine xmlns:a14="http://schemas.microsoft.com/office/drawing/2010/main" xmlns="" w="9525">
                     <a:solidFill>
                       <a:srgbClr val="000000"/>
                     </a:solidFill>
@@ -9543,7 +9543,7 @@
               </a:ln>
               <a:extLst>
                 <a:ext uri="{91240B29-F687-4f45-9708-019B960494DF}">
-                  <a14:hiddenLine xmlns="" xmlns:a14="http://schemas.microsoft.com/office/drawing/2010/main" w="9525">
+                  <a14:hiddenLine xmlns:a14="http://schemas.microsoft.com/office/drawing/2010/main" xmlns="" w="9525">
                     <a:solidFill>
                       <a:srgbClr val="000000"/>
                     </a:solidFill>
@@ -9605,7 +9605,7 @@
               </a:ln>
               <a:extLst>
                 <a:ext uri="{91240B29-F687-4f45-9708-019B960494DF}">
-                  <a14:hiddenLine xmlns="" xmlns:a14="http://schemas.microsoft.com/office/drawing/2010/main" w="9525">
+                  <a14:hiddenLine xmlns:a14="http://schemas.microsoft.com/office/drawing/2010/main" xmlns="" w="9525">
                     <a:solidFill>
                       <a:srgbClr val="000000"/>
                     </a:solidFill>
@@ -9695,7 +9695,7 @@
               </a:ln>
               <a:extLst>
                 <a:ext uri="{91240B29-F687-4f45-9708-019B960494DF}">
-                  <a14:hiddenLine xmlns="" xmlns:a14="http://schemas.microsoft.com/office/drawing/2010/main" w="9525">
+                  <a14:hiddenLine xmlns:a14="http://schemas.microsoft.com/office/drawing/2010/main" xmlns="" w="9525">
                     <a:solidFill>
                       <a:srgbClr val="000000"/>
                     </a:solidFill>
@@ -9785,7 +9785,7 @@
               </a:ln>
               <a:extLst>
                 <a:ext uri="{91240B29-F687-4f45-9708-019B960494DF}">
-                  <a14:hiddenLine xmlns="" xmlns:a14="http://schemas.microsoft.com/office/drawing/2010/main" w="9525">
+                  <a14:hiddenLine xmlns:a14="http://schemas.microsoft.com/office/drawing/2010/main" xmlns="" w="9525">
                     <a:solidFill>
                       <a:srgbClr val="000000"/>
                     </a:solidFill>
@@ -9847,7 +9847,7 @@
               </a:ln>
               <a:extLst>
                 <a:ext uri="{91240B29-F687-4f45-9708-019B960494DF}">
-                  <a14:hiddenLine xmlns="" xmlns:a14="http://schemas.microsoft.com/office/drawing/2010/main" w="9525">
+                  <a14:hiddenLine xmlns:a14="http://schemas.microsoft.com/office/drawing/2010/main" xmlns="" w="9525">
                     <a:solidFill>
                       <a:srgbClr val="000000"/>
                     </a:solidFill>
@@ -9957,7 +9957,7 @@
               </a:ln>
               <a:extLst>
                 <a:ext uri="{91240B29-F687-4f45-9708-019B960494DF}">
-                  <a14:hiddenLine xmlns="" xmlns:a14="http://schemas.microsoft.com/office/drawing/2010/main" w="9525">
+                  <a14:hiddenLine xmlns:a14="http://schemas.microsoft.com/office/drawing/2010/main" xmlns="" w="9525">
                     <a:solidFill>
                       <a:srgbClr val="000000"/>
                     </a:solidFill>
@@ -10041,7 +10041,7 @@
               </a:ln>
               <a:extLst>
                 <a:ext uri="{91240B29-F687-4f45-9708-019B960494DF}">
-                  <a14:hiddenLine xmlns="" xmlns:a14="http://schemas.microsoft.com/office/drawing/2010/main" w="9525">
+                  <a14:hiddenLine xmlns:a14="http://schemas.microsoft.com/office/drawing/2010/main" xmlns="" w="9525">
                     <a:solidFill>
                       <a:srgbClr val="000000"/>
                     </a:solidFill>
@@ -10103,7 +10103,7 @@
               </a:ln>
               <a:extLst>
                 <a:ext uri="{91240B29-F687-4f45-9708-019B960494DF}">
-                  <a14:hiddenLine xmlns="" xmlns:a14="http://schemas.microsoft.com/office/drawing/2010/main" w="9525">
+                  <a14:hiddenLine xmlns:a14="http://schemas.microsoft.com/office/drawing/2010/main" xmlns="" w="9525">
                     <a:solidFill>
                       <a:srgbClr val="000000"/>
                     </a:solidFill>
@@ -10165,7 +10165,7 @@
               </a:ln>
               <a:extLst>
                 <a:ext uri="{91240B29-F687-4f45-9708-019B960494DF}">
-                  <a14:hiddenLine xmlns="" xmlns:a14="http://schemas.microsoft.com/office/drawing/2010/main" w="9525">
+                  <a14:hiddenLine xmlns:a14="http://schemas.microsoft.com/office/drawing/2010/main" xmlns="" w="9525">
                     <a:solidFill>
                       <a:srgbClr val="000000"/>
                     </a:solidFill>
@@ -10255,7 +10255,7 @@
               </a:ln>
               <a:extLst>
                 <a:ext uri="{91240B29-F687-4f45-9708-019B960494DF}">
-                  <a14:hiddenLine xmlns="" xmlns:a14="http://schemas.microsoft.com/office/drawing/2010/main" w="9525">
+                  <a14:hiddenLine xmlns:a14="http://schemas.microsoft.com/office/drawing/2010/main" xmlns="" w="9525">
                     <a:solidFill>
                       <a:srgbClr val="000000"/>
                     </a:solidFill>
@@ -10289,7 +10289,7 @@
               </a:ln>
               <a:extLst>
                 <a:ext uri="{91240B29-F687-4f45-9708-019B960494DF}">
-                  <a14:hiddenLine xmlns="" xmlns:a14="http://schemas.microsoft.com/office/drawing/2010/main" w="9525">
+                  <a14:hiddenLine xmlns:a14="http://schemas.microsoft.com/office/drawing/2010/main" xmlns="" w="9525">
                     <a:solidFill>
                       <a:srgbClr val="000000"/>
                     </a:solidFill>
@@ -10354,7 +10354,7 @@
               </a:ln>
               <a:extLst>
                 <a:ext uri="{91240B29-F687-4f45-9708-019B960494DF}">
-                  <a14:hiddenLine xmlns="" xmlns:a14="http://schemas.microsoft.com/office/drawing/2010/main" w="9525">
+                  <a14:hiddenLine xmlns:a14="http://schemas.microsoft.com/office/drawing/2010/main" xmlns="" w="9525">
                     <a:solidFill>
                       <a:srgbClr val="000000"/>
                     </a:solidFill>
@@ -10444,7 +10444,7 @@
               </a:ln>
               <a:extLst>
                 <a:ext uri="{91240B29-F687-4f45-9708-019B960494DF}">
-                  <a14:hiddenLine xmlns="" xmlns:a14="http://schemas.microsoft.com/office/drawing/2010/main" w="9525">
+                  <a14:hiddenLine xmlns:a14="http://schemas.microsoft.com/office/drawing/2010/main" xmlns="" w="9525">
                     <a:solidFill>
                       <a:srgbClr val="000000"/>
                     </a:solidFill>
@@ -10506,7 +10506,7 @@
               </a:ln>
               <a:extLst>
                 <a:ext uri="{91240B29-F687-4f45-9708-019B960494DF}">
-                  <a14:hiddenLine xmlns="" xmlns:a14="http://schemas.microsoft.com/office/drawing/2010/main" w="9525">
+                  <a14:hiddenLine xmlns:a14="http://schemas.microsoft.com/office/drawing/2010/main" xmlns="" w="9525">
                     <a:solidFill>
                       <a:srgbClr val="000000"/>
                     </a:solidFill>
@@ -10596,7 +10596,7 @@
               </a:ln>
               <a:extLst>
                 <a:ext uri="{91240B29-F687-4f45-9708-019B960494DF}">
-                  <a14:hiddenLine xmlns="" xmlns:a14="http://schemas.microsoft.com/office/drawing/2010/main" w="9525">
+                  <a14:hiddenLine xmlns:a14="http://schemas.microsoft.com/office/drawing/2010/main" xmlns="" w="9525">
                     <a:solidFill>
                       <a:srgbClr val="000000"/>
                     </a:solidFill>
@@ -10661,7 +10661,7 @@
               </a:ln>
               <a:extLst>
                 <a:ext uri="{91240B29-F687-4f45-9708-019B960494DF}">
-                  <a14:hiddenLine xmlns="" xmlns:a14="http://schemas.microsoft.com/office/drawing/2010/main" w="9525">
+                  <a14:hiddenLine xmlns:a14="http://schemas.microsoft.com/office/drawing/2010/main" xmlns="" w="9525">
                     <a:solidFill>
                       <a:srgbClr val="000000"/>
                     </a:solidFill>
@@ -10723,7 +10723,7 @@
               </a:ln>
               <a:extLst>
                 <a:ext uri="{91240B29-F687-4f45-9708-019B960494DF}">
-                  <a14:hiddenLine xmlns="" xmlns:a14="http://schemas.microsoft.com/office/drawing/2010/main" w="9525">
+                  <a14:hiddenLine xmlns:a14="http://schemas.microsoft.com/office/drawing/2010/main" xmlns="" w="9525">
                     <a:solidFill>
                       <a:srgbClr val="000000"/>
                     </a:solidFill>
@@ -10813,7 +10813,7 @@
               </a:ln>
               <a:extLst>
                 <a:ext uri="{91240B29-F687-4f45-9708-019B960494DF}">
-                  <a14:hiddenLine xmlns="" xmlns:a14="http://schemas.microsoft.com/office/drawing/2010/main" w="9525">
+                  <a14:hiddenLine xmlns:a14="http://schemas.microsoft.com/office/drawing/2010/main" xmlns="" w="9525">
                     <a:solidFill>
                       <a:srgbClr val="000000"/>
                     </a:solidFill>
@@ -10903,7 +10903,7 @@
               </a:ln>
               <a:extLst>
                 <a:ext uri="{91240B29-F687-4f45-9708-019B960494DF}">
-                  <a14:hiddenLine xmlns="" xmlns:a14="http://schemas.microsoft.com/office/drawing/2010/main" w="9525">
+                  <a14:hiddenLine xmlns:a14="http://schemas.microsoft.com/office/drawing/2010/main" xmlns="" w="9525">
                     <a:solidFill>
                       <a:srgbClr val="000000"/>
                     </a:solidFill>
@@ -10968,7 +10968,7 @@
               </a:ln>
               <a:extLst>
                 <a:ext uri="{91240B29-F687-4f45-9708-019B960494DF}">
-                  <a14:hiddenLine xmlns="" xmlns:a14="http://schemas.microsoft.com/office/drawing/2010/main" w="9525">
+                  <a14:hiddenLine xmlns:a14="http://schemas.microsoft.com/office/drawing/2010/main" xmlns="" w="9525">
                     <a:solidFill>
                       <a:srgbClr val="000000"/>
                     </a:solidFill>
@@ -11088,7 +11088,7 @@
               </a:ln>
               <a:extLst>
                 <a:ext uri="{91240B29-F687-4f45-9708-019B960494DF}">
-                  <a14:hiddenLine xmlns="" xmlns:a14="http://schemas.microsoft.com/office/drawing/2010/main" w="9525">
+                  <a14:hiddenLine xmlns:a14="http://schemas.microsoft.com/office/drawing/2010/main" xmlns="" w="9525">
                     <a:solidFill>
                       <a:srgbClr val="000000"/>
                     </a:solidFill>
@@ -11186,7 +11186,7 @@
               </a:ln>
               <a:extLst>
                 <a:ext uri="{91240B29-F687-4f45-9708-019B960494DF}">
-                  <a14:hiddenLine xmlns="" xmlns:a14="http://schemas.microsoft.com/office/drawing/2010/main" w="9525">
+                  <a14:hiddenLine xmlns:a14="http://schemas.microsoft.com/office/drawing/2010/main" xmlns="" w="9525">
                     <a:solidFill>
                       <a:srgbClr val="000000"/>
                     </a:solidFill>
@@ -11301,7 +11301,7 @@
               </a:ln>
               <a:extLst>
                 <a:ext uri="{91240B29-F687-4f45-9708-019B960494DF}">
-                  <a14:hiddenLine xmlns="" xmlns:a14="http://schemas.microsoft.com/office/drawing/2010/main" w="9525">
+                  <a14:hiddenLine xmlns:a14="http://schemas.microsoft.com/office/drawing/2010/main" xmlns="" w="9525">
                     <a:solidFill>
                       <a:srgbClr val="000000"/>
                     </a:solidFill>
@@ -11391,7 +11391,7 @@
               </a:ln>
               <a:extLst>
                 <a:ext uri="{91240B29-F687-4f45-9708-019B960494DF}">
-                  <a14:hiddenLine xmlns="" xmlns:a14="http://schemas.microsoft.com/office/drawing/2010/main" w="9525">
+                  <a14:hiddenLine xmlns:a14="http://schemas.microsoft.com/office/drawing/2010/main" xmlns="" w="9525">
                     <a:solidFill>
                       <a:srgbClr val="000000"/>
                     </a:solidFill>
@@ -11456,7 +11456,7 @@
               </a:ln>
               <a:extLst>
                 <a:ext uri="{91240B29-F687-4f45-9708-019B960494DF}">
-                  <a14:hiddenLine xmlns="" xmlns:a14="http://schemas.microsoft.com/office/drawing/2010/main" w="9525">
+                  <a14:hiddenLine xmlns:a14="http://schemas.microsoft.com/office/drawing/2010/main" xmlns="" w="9525">
                     <a:solidFill>
                       <a:srgbClr val="000000"/>
                     </a:solidFill>
@@ -11546,7 +11546,7 @@
               </a:ln>
               <a:extLst>
                 <a:ext uri="{91240B29-F687-4f45-9708-019B960494DF}">
-                  <a14:hiddenLine xmlns="" xmlns:a14="http://schemas.microsoft.com/office/drawing/2010/main" w="9525">
+                  <a14:hiddenLine xmlns:a14="http://schemas.microsoft.com/office/drawing/2010/main" xmlns="" w="9525">
                     <a:solidFill>
                       <a:srgbClr val="000000"/>
                     </a:solidFill>
@@ -11614,7 +11614,7 @@
               </a:ln>
               <a:extLst>
                 <a:ext uri="{91240B29-F687-4f45-9708-019B960494DF}">
-                  <a14:hiddenLine xmlns="" xmlns:a14="http://schemas.microsoft.com/office/drawing/2010/main" w="9525">
+                  <a14:hiddenLine xmlns:a14="http://schemas.microsoft.com/office/drawing/2010/main" xmlns="" w="9525">
                     <a:solidFill>
                       <a:srgbClr val="000000"/>
                     </a:solidFill>
@@ -11704,7 +11704,7 @@
               </a:ln>
               <a:extLst>
                 <a:ext uri="{91240B29-F687-4f45-9708-019B960494DF}">
-                  <a14:hiddenLine xmlns="" xmlns:a14="http://schemas.microsoft.com/office/drawing/2010/main" w="9525">
+                  <a14:hiddenLine xmlns:a14="http://schemas.microsoft.com/office/drawing/2010/main" xmlns="" w="9525">
                     <a:solidFill>
                       <a:srgbClr val="000000"/>
                     </a:solidFill>
@@ -11772,7 +11772,7 @@
               </a:ln>
               <a:extLst>
                 <a:ext uri="{91240B29-F687-4f45-9708-019B960494DF}">
-                  <a14:hiddenLine xmlns="" xmlns:a14="http://schemas.microsoft.com/office/drawing/2010/main" w="9525">
+                  <a14:hiddenLine xmlns:a14="http://schemas.microsoft.com/office/drawing/2010/main" xmlns="" w="9525">
                     <a:solidFill>
                       <a:srgbClr val="000000"/>
                     </a:solidFill>
@@ -11862,7 +11862,7 @@
               </a:ln>
               <a:extLst>
                 <a:ext uri="{91240B29-F687-4f45-9708-019B960494DF}">
-                  <a14:hiddenLine xmlns="" xmlns:a14="http://schemas.microsoft.com/office/drawing/2010/main" w="9525">
+                  <a14:hiddenLine xmlns:a14="http://schemas.microsoft.com/office/drawing/2010/main" xmlns="" w="9525">
                     <a:solidFill>
                       <a:srgbClr val="000000"/>
                     </a:solidFill>
@@ -11896,7 +11896,7 @@
               </a:ln>
               <a:extLst>
                 <a:ext uri="{91240B29-F687-4f45-9708-019B960494DF}">
-                  <a14:hiddenLine xmlns="" xmlns:a14="http://schemas.microsoft.com/office/drawing/2010/main" w="9525">
+                  <a14:hiddenLine xmlns:a14="http://schemas.microsoft.com/office/drawing/2010/main" xmlns="" w="9525">
                     <a:solidFill>
                       <a:srgbClr val="000000"/>
                     </a:solidFill>
@@ -12036,7 +12036,7 @@
           <a:p>
             <a:fld id="{841D4EFB-1649-4F74-89D1-9FCA056B78EF}" type="datetimeFigureOut">
               <a:rPr lang="en-US" smtClean="0"/>
-              <a:t>12/12/2014</a:t>
+              <a:t>12/13/2014</a:t>
             </a:fld>
             <a:endParaRPr lang="en-US"/>
           </a:p>
@@ -12547,15 +12547,11 @@
               <a:t>Параметри на функции в </a:t>
             </a:r>
             <a:r>
-              <a:rPr lang="en-US" dirty="0" err="1"/>
-              <a:t>php</a:t>
-            </a:r>
-            <a:r>
-              <a:rPr lang="bg-BG" dirty="0"/>
-              <a:t> </a:t>
-            </a:r>
-            <a:r>
-              <a:rPr lang="bg-BG" dirty="0" err="1"/>
+              <a:rPr lang="en-US" dirty="0" smtClean="0"/>
+              <a:t>JAVA </a:t>
+            </a:r>
+            <a:r>
+              <a:rPr lang="bg-BG" dirty="0" err="1" smtClean="0"/>
               <a:t>ДЕмо</a:t>
             </a:r>
             <a:endParaRPr lang="en-US" dirty="0"/>

</xml_diff>